<commit_message>
Foram feitas pequenas alterações no arquivo apresentação.pptx.
</commit_message>
<xml_diff>
--- a/documentos/apresentação.pptx
+++ b/documentos/apresentação.pptx
@@ -780,7 +780,7 @@
             <a:fld id="{2E700DB3-DBF0-4086-B675-117E7A9610B8}" type="datetimeFigureOut">
               <a:rPr lang="pt-BR" smtClean="0"/>
               <a:pPr/>
-              <a:t>25/06/2010</a:t>
+              <a:t>27/06/2010</a:t>
             </a:fld>
             <a:endParaRPr lang="pt-BR" dirty="0"/>
           </a:p>
@@ -965,7 +965,7 @@
             <a:fld id="{2E700DB3-DBF0-4086-B675-117E7A9610B8}" type="datetimeFigureOut">
               <a:rPr lang="pt-BR" smtClean="0"/>
               <a:pPr/>
-              <a:t>25/06/2010</a:t>
+              <a:t>27/06/2010</a:t>
             </a:fld>
             <a:endParaRPr lang="pt-BR" dirty="0"/>
           </a:p>
@@ -1142,7 +1142,7 @@
             <a:fld id="{2E700DB3-DBF0-4086-B675-117E7A9610B8}" type="datetimeFigureOut">
               <a:rPr lang="pt-BR" smtClean="0"/>
               <a:pPr/>
-              <a:t>25/06/2010</a:t>
+              <a:t>27/06/2010</a:t>
             </a:fld>
             <a:endParaRPr lang="pt-BR" dirty="0"/>
           </a:p>
@@ -1309,7 +1309,7 @@
             <a:fld id="{2E700DB3-DBF0-4086-B675-117E7A9610B8}" type="datetimeFigureOut">
               <a:rPr lang="pt-BR" smtClean="0"/>
               <a:pPr/>
-              <a:t>25/06/2010</a:t>
+              <a:t>27/06/2010</a:t>
             </a:fld>
             <a:endParaRPr lang="pt-BR" dirty="0"/>
           </a:p>
@@ -1532,7 +1532,7 @@
             <a:fld id="{2E700DB3-DBF0-4086-B675-117E7A9610B8}" type="datetimeFigureOut">
               <a:rPr lang="pt-BR" smtClean="0"/>
               <a:pPr/>
-              <a:t>25/06/2010</a:t>
+              <a:t>27/06/2010</a:t>
             </a:fld>
             <a:endParaRPr lang="pt-BR" dirty="0"/>
           </a:p>
@@ -1793,7 +1793,7 @@
             <a:fld id="{2E700DB3-DBF0-4086-B675-117E7A9610B8}" type="datetimeFigureOut">
               <a:rPr lang="pt-BR" smtClean="0"/>
               <a:pPr/>
-              <a:t>25/06/2010</a:t>
+              <a:t>27/06/2010</a:t>
             </a:fld>
             <a:endParaRPr lang="pt-BR" dirty="0"/>
           </a:p>
@@ -2199,7 +2199,7 @@
             <a:fld id="{2E700DB3-DBF0-4086-B675-117E7A9610B8}" type="datetimeFigureOut">
               <a:rPr lang="pt-BR" smtClean="0"/>
               <a:pPr/>
-              <a:t>25/06/2010</a:t>
+              <a:t>27/06/2010</a:t>
             </a:fld>
             <a:endParaRPr lang="pt-BR" dirty="0"/>
           </a:p>
@@ -2332,7 +2332,7 @@
             <a:fld id="{2E700DB3-DBF0-4086-B675-117E7A9610B8}" type="datetimeFigureOut">
               <a:rPr lang="pt-BR" smtClean="0"/>
               <a:pPr/>
-              <a:t>25/06/2010</a:t>
+              <a:t>27/06/2010</a:t>
             </a:fld>
             <a:endParaRPr lang="pt-BR" dirty="0"/>
           </a:p>
@@ -2434,7 +2434,7 @@
             <a:fld id="{2E700DB3-DBF0-4086-B675-117E7A9610B8}" type="datetimeFigureOut">
               <a:rPr lang="pt-BR" smtClean="0"/>
               <a:pPr/>
-              <a:t>25/06/2010</a:t>
+              <a:t>27/06/2010</a:t>
             </a:fld>
             <a:endParaRPr lang="pt-BR" dirty="0"/>
           </a:p>
@@ -2681,7 +2681,7 @@
             <a:fld id="{2E700DB3-DBF0-4086-B675-117E7A9610B8}" type="datetimeFigureOut">
               <a:rPr lang="pt-BR" smtClean="0"/>
               <a:pPr/>
-              <a:t>25/06/2010</a:t>
+              <a:t>27/06/2010</a:t>
             </a:fld>
             <a:endParaRPr lang="pt-BR" dirty="0"/>
           </a:p>
@@ -2927,7 +2927,7 @@
             <a:fld id="{2E700DB3-DBF0-4086-B675-117E7A9610B8}" type="datetimeFigureOut">
               <a:rPr lang="pt-BR" smtClean="0"/>
               <a:pPr/>
-              <a:t>25/06/2010</a:t>
+              <a:t>27/06/2010</a:t>
             </a:fld>
             <a:endParaRPr lang="pt-BR" dirty="0"/>
           </a:p>
@@ -3753,7 +3753,7 @@
             <a:fld id="{2E700DB3-DBF0-4086-B675-117E7A9610B8}" type="datetimeFigureOut">
               <a:rPr lang="pt-BR" smtClean="0"/>
               <a:pPr/>
-              <a:t>25/06/2010</a:t>
+              <a:t>27/06/2010</a:t>
             </a:fld>
             <a:endParaRPr lang="pt-BR" dirty="0"/>
           </a:p>
@@ -4746,7 +4746,7 @@
         <p:spPr/>
         <p:txBody>
           <a:bodyPr>
-            <a:normAutofit/>
+            <a:normAutofit lnSpcReduction="10000"/>
           </a:bodyPr>
           <a:lstStyle/>
           <a:p>
@@ -4788,7 +4788,21 @@
           <a:p>
             <a:r>
               <a:rPr lang="pt-BR" sz="2200" dirty="0" smtClean="0"/>
-              <a:t>A documentação do MSP430 não tem informações suficientes sobre o funcionamento da interface SPI a 3 fios, além de não conter um algoritmo de leitura/escrita.</a:t>
+              <a:t>A documentação do MSP430 não tem informações suficientes sobre o funcionamento da interface SPI a 3 </a:t>
+            </a:r>
+            <a:r>
+              <a:rPr lang="pt-BR" sz="2200" dirty="0" smtClean="0"/>
+              <a:t>fios</a:t>
+            </a:r>
+            <a:r>
+              <a:rPr lang="pt-BR" sz="2200" dirty="0" smtClean="0"/>
+              <a:t>.</a:t>
+            </a:r>
+          </a:p>
+          <a:p>
+            <a:r>
+              <a:rPr lang="pt-BR" sz="2200" dirty="0" smtClean="0"/>
+              <a:t>A documentação do acelerômetro contém um algoritmo de leitura/escrita que mostrou não ser adequado para funcionar no modo SPI a 3 fios.</a:t>
             </a:r>
             <a:endParaRPr lang="pt-BR" sz="2200" dirty="0"/>
           </a:p>
@@ -4869,169 +4883,165 @@
           <a:lstStyle/>
           <a:p>
             <a:r>
-              <a:rPr lang="pt-BR" sz="2200" i="1" dirty="0" smtClean="0"/>
+              <a:rPr lang="pt-BR" sz="1800" i="1" dirty="0" smtClean="0"/>
               <a:t>MSP430 </a:t>
             </a:r>
             <a:r>
-              <a:rPr lang="pt-BR" sz="2200" i="1" dirty="0" err="1" smtClean="0"/>
+              <a:rPr lang="pt-BR" sz="1800" i="1" dirty="0" err="1" smtClean="0"/>
               <a:t>Microcontroller</a:t>
             </a:r>
             <a:r>
-              <a:rPr lang="pt-BR" sz="2200" i="1" dirty="0" smtClean="0"/>
+              <a:rPr lang="pt-BR" sz="1800" i="1" dirty="0" smtClean="0"/>
               <a:t> </a:t>
             </a:r>
             <a:r>
-              <a:rPr lang="pt-BR" sz="2200" i="1" dirty="0" err="1" smtClean="0"/>
+              <a:rPr lang="pt-BR" sz="1800" i="1" dirty="0" err="1" smtClean="0"/>
               <a:t>Basics</a:t>
             </a:r>
             <a:r>
-              <a:rPr lang="pt-BR" sz="2200" dirty="0" smtClean="0"/>
+              <a:rPr lang="pt-BR" sz="1800" dirty="0" smtClean="0"/>
               <a:t>, John </a:t>
             </a:r>
             <a:r>
-              <a:rPr lang="pt-BR" sz="2200" dirty="0" err="1" smtClean="0"/>
+              <a:rPr lang="pt-BR" sz="1800" dirty="0" err="1" smtClean="0"/>
               <a:t>Davies</a:t>
             </a:r>
             <a:r>
-              <a:rPr lang="pt-BR" sz="2200" dirty="0" smtClean="0"/>
+              <a:rPr lang="pt-BR" sz="1800" dirty="0" smtClean="0"/>
               <a:t>, 2008</a:t>
             </a:r>
           </a:p>
           <a:p>
             <a:r>
-              <a:rPr lang="pt-BR" sz="2200" i="1" dirty="0" smtClean="0"/>
+              <a:rPr lang="pt-BR" sz="1800" i="1" dirty="0" smtClean="0"/>
               <a:t>MMA7455L Datasheet</a:t>
             </a:r>
             <a:r>
-              <a:rPr lang="pt-BR" sz="2200" dirty="0" smtClean="0"/>
+              <a:rPr lang="pt-BR" sz="1800" dirty="0" smtClean="0"/>
               <a:t>, Freescale </a:t>
             </a:r>
             <a:r>
-              <a:rPr lang="pt-BR" sz="2200" dirty="0" err="1" smtClean="0"/>
+              <a:rPr lang="pt-BR" sz="1800" dirty="0" err="1" smtClean="0"/>
               <a:t>Semiconductor</a:t>
             </a:r>
             <a:r>
-              <a:rPr lang="pt-BR" sz="2200" dirty="0" smtClean="0"/>
+              <a:rPr lang="pt-BR" sz="1800" dirty="0" smtClean="0"/>
               <a:t>, 2009</a:t>
             </a:r>
           </a:p>
           <a:p>
             <a:r>
-              <a:rPr lang="pt-BR" sz="2200" i="1" dirty="0" err="1" smtClean="0"/>
+              <a:rPr lang="pt-BR" sz="1800" i="1" dirty="0" err="1" smtClean="0"/>
               <a:t>The</a:t>
             </a:r>
             <a:r>
-              <a:rPr lang="pt-BR" sz="2200" i="1" dirty="0" smtClean="0"/>
+              <a:rPr lang="pt-BR" sz="1800" i="1" dirty="0" smtClean="0"/>
               <a:t> MMA745xL Digital </a:t>
             </a:r>
             <a:r>
-              <a:rPr lang="pt-BR" sz="2200" i="1" dirty="0" err="1" smtClean="0"/>
+              <a:rPr lang="pt-BR" sz="1800" i="1" dirty="0" err="1" smtClean="0"/>
               <a:t>Accelerometer</a:t>
             </a:r>
             <a:r>
-              <a:rPr lang="pt-BR" sz="2200" i="1" dirty="0" smtClean="0"/>
+              <a:rPr lang="pt-BR" sz="1800" i="1" dirty="0" smtClean="0"/>
               <a:t> (AN3468)</a:t>
             </a:r>
             <a:r>
-              <a:rPr lang="pt-BR" sz="2200" dirty="0" smtClean="0"/>
+              <a:rPr lang="pt-BR" sz="1800" dirty="0" smtClean="0"/>
               <a:t>, Freescale </a:t>
             </a:r>
             <a:r>
-              <a:rPr lang="pt-BR" sz="2200" dirty="0" err="1" smtClean="0"/>
+              <a:rPr lang="pt-BR" sz="1800" dirty="0" err="1" smtClean="0"/>
               <a:t>Semiconductor</a:t>
             </a:r>
             <a:r>
-              <a:rPr lang="pt-BR" sz="2200" dirty="0" smtClean="0"/>
+              <a:rPr lang="pt-BR" sz="1800" dirty="0" smtClean="0"/>
               <a:t>, 2009</a:t>
             </a:r>
           </a:p>
           <a:p>
             <a:r>
-              <a:rPr lang="en-US" sz="2200" i="1" dirty="0" smtClean="0"/>
+              <a:rPr lang="en-US" sz="1800" i="1" dirty="0" smtClean="0"/>
               <a:t>CC2500 Datasheet</a:t>
             </a:r>
             <a:r>
-              <a:rPr lang="en-US" sz="2200" dirty="0" smtClean="0"/>
+              <a:rPr lang="en-US" sz="1800" dirty="0" smtClean="0"/>
               <a:t>, </a:t>
             </a:r>
             <a:r>
-              <a:rPr lang="en-US" sz="2200" dirty="0" err="1" smtClean="0"/>
+              <a:rPr lang="en-US" sz="1800" dirty="0" err="1" smtClean="0"/>
               <a:t>Chipcon</a:t>
             </a:r>
             <a:r>
-              <a:rPr lang="en-US" sz="2200" dirty="0" smtClean="0"/>
+              <a:rPr lang="en-US" sz="1800" dirty="0" smtClean="0"/>
               <a:t>, 2006</a:t>
             </a:r>
           </a:p>
           <a:p>
             <a:r>
-              <a:rPr lang="pt-BR" sz="2200" i="1" dirty="0" smtClean="0"/>
+              <a:rPr lang="pt-BR" sz="1800" i="1" dirty="0" smtClean="0"/>
               <a:t>eZ430-RF2500 </a:t>
             </a:r>
             <a:r>
-              <a:rPr lang="pt-BR" sz="2200" i="1" dirty="0" err="1" smtClean="0"/>
+              <a:rPr lang="pt-BR" sz="1800" i="1" dirty="0" err="1" smtClean="0"/>
               <a:t>Development</a:t>
             </a:r>
             <a:r>
-              <a:rPr lang="pt-BR" sz="2200" i="1" dirty="0" smtClean="0"/>
+              <a:rPr lang="pt-BR" sz="1800" i="1" dirty="0" smtClean="0"/>
               <a:t> </a:t>
             </a:r>
             <a:r>
-              <a:rPr lang="pt-BR" sz="2200" i="1" dirty="0" err="1" smtClean="0"/>
+              <a:rPr lang="pt-BR" sz="1800" i="1" dirty="0" err="1" smtClean="0"/>
               <a:t>Tool</a:t>
             </a:r>
             <a:r>
-              <a:rPr lang="pt-BR" sz="2200" i="1" dirty="0" smtClean="0"/>
+              <a:rPr lang="pt-BR" sz="1800" i="1" dirty="0" smtClean="0"/>
               <a:t> – </a:t>
             </a:r>
             <a:r>
-              <a:rPr lang="pt-BR" sz="2200" i="1" dirty="0" err="1" smtClean="0"/>
+              <a:rPr lang="pt-BR" sz="1800" i="1" dirty="0" err="1" smtClean="0"/>
               <a:t>User’s</a:t>
             </a:r>
             <a:r>
-              <a:rPr lang="pt-BR" sz="2200" i="1" dirty="0" smtClean="0"/>
+              <a:rPr lang="pt-BR" sz="1800" i="1" dirty="0" smtClean="0"/>
               <a:t> </a:t>
             </a:r>
             <a:r>
-              <a:rPr lang="pt-BR" sz="2200" i="1" dirty="0" err="1" smtClean="0"/>
+              <a:rPr lang="pt-BR" sz="1800" i="1" dirty="0" err="1" smtClean="0"/>
               <a:t>Guide</a:t>
             </a:r>
             <a:r>
-              <a:rPr lang="pt-BR" sz="2200" dirty="0" smtClean="0"/>
+              <a:rPr lang="pt-BR" sz="1800" dirty="0" smtClean="0"/>
               <a:t>, Texas Instruments, 2009</a:t>
             </a:r>
           </a:p>
           <a:p>
             <a:r>
-              <a:rPr lang="pt-BR" sz="2200" i="1" dirty="0" smtClean="0"/>
+              <a:rPr lang="pt-BR" sz="1800" i="1" dirty="0" smtClean="0"/>
               <a:t>MSP430x2xx </a:t>
             </a:r>
             <a:r>
-              <a:rPr lang="pt-BR" sz="2200" i="1" dirty="0" err="1" smtClean="0"/>
+              <a:rPr lang="pt-BR" sz="1800" i="1" dirty="0" err="1" smtClean="0"/>
               <a:t>Family</a:t>
             </a:r>
             <a:r>
-              <a:rPr lang="pt-BR" sz="2200" i="1" dirty="0" smtClean="0"/>
+              <a:rPr lang="pt-BR" sz="1800" i="1" dirty="0" smtClean="0"/>
+              <a:t> – </a:t>
+            </a:r>
+            <a:r>
+              <a:rPr lang="pt-BR" sz="1800" i="1" dirty="0" err="1" smtClean="0"/>
+              <a:t>User's</a:t>
+            </a:r>
+            <a:r>
+              <a:rPr lang="pt-BR" sz="1800" i="1" dirty="0" smtClean="0"/>
               <a:t> </a:t>
             </a:r>
             <a:r>
-              <a:rPr lang="pt-BR" sz="2200" i="1" dirty="0" smtClean="0"/>
-              <a:t>– </a:t>
-            </a:r>
-            <a:r>
-              <a:rPr lang="pt-BR" sz="2200" i="1" dirty="0" err="1" smtClean="0"/>
-              <a:t>User's</a:t>
-            </a:r>
-            <a:r>
-              <a:rPr lang="pt-BR" sz="2200" i="1" dirty="0" smtClean="0"/>
-              <a:t> </a:t>
-            </a:r>
-            <a:r>
-              <a:rPr lang="pt-BR" sz="2200" i="1" dirty="0" err="1" smtClean="0"/>
+              <a:rPr lang="pt-BR" sz="1800" i="1" dirty="0" err="1" smtClean="0"/>
               <a:t>Guide</a:t>
             </a:r>
             <a:r>
-              <a:rPr lang="pt-BR" sz="2200" dirty="0" smtClean="0"/>
+              <a:rPr lang="pt-BR" sz="1800" dirty="0" smtClean="0"/>
               <a:t>, Texas Instruments, 2009</a:t>
             </a:r>
           </a:p>
@@ -5231,15 +5241,7 @@
           <a:p>
             <a:r>
               <a:rPr lang="pt-BR" sz="2200" dirty="0" smtClean="0"/>
-              <a:t>Utilizando o kit de desenvolvimento eZ430-RF2500 desenvolver um controle remoto </a:t>
-            </a:r>
-            <a:r>
-              <a:rPr lang="pt-BR" sz="2200" dirty="0" smtClean="0"/>
-              <a:t>com o acelerômetro </a:t>
-            </a:r>
-            <a:r>
-              <a:rPr lang="pt-BR" sz="2200" dirty="0" smtClean="0"/>
-              <a:t>MMA7455L da Freescale.</a:t>
+              <a:t>Utilizando o kit de desenvolvimento eZ430-RF2500 desenvolver um controle remoto com o acelerômetro MMA7455L da Freescale.</a:t>
             </a:r>
           </a:p>
           <a:p>
@@ -5324,7 +5326,12 @@
             <p:ph type="title"/>
           </p:nvPr>
         </p:nvSpPr>
-        <p:spPr/>
+        <p:spPr>
+          <a:xfrm>
+            <a:off x="457200" y="785794"/>
+            <a:ext cx="8229600" cy="1066800"/>
+          </a:xfrm>
+        </p:spPr>
         <p:txBody>
           <a:bodyPr>
             <a:normAutofit/>
@@ -5356,8 +5363,8 @@
         </p:blipFill>
         <p:spPr bwMode="auto">
           <a:xfrm>
-            <a:off x="285720" y="1940617"/>
-            <a:ext cx="8572528" cy="4703093"/>
+            <a:off x="155507" y="1583411"/>
+            <a:ext cx="8832983" cy="4845985"/>
           </a:xfrm>
           <a:prstGeom prst="rect">
             <a:avLst/>
@@ -5403,31 +5410,6 @@
           <a:chExt cx="0" cy="0"/>
         </a:xfrm>
       </p:grpSpPr>
-      <p:sp>
-        <p:nvSpPr>
-          <p:cNvPr id="2" name="Título 1"/>
-          <p:cNvSpPr>
-            <a:spLocks noGrp="1"/>
-          </p:cNvSpPr>
-          <p:nvPr>
-            <p:ph type="title"/>
-          </p:nvPr>
-        </p:nvSpPr>
-        <p:spPr/>
-        <p:txBody>
-          <a:bodyPr>
-            <a:normAutofit/>
-          </a:bodyPr>
-          <a:lstStyle/>
-          <a:p>
-            <a:r>
-              <a:rPr lang="pt-BR" sz="2500" dirty="0" smtClean="0"/>
-              <a:t>HARDWARE</a:t>
-            </a:r>
-            <a:endParaRPr lang="pt-BR" sz="2500" dirty="0"/>
-          </a:p>
-        </p:txBody>
-      </p:sp>
       <p:pic>
         <p:nvPicPr>
           <p:cNvPr id="8195" name="Picture 3"/>
@@ -5445,8 +5427,8 @@
         </p:blipFill>
         <p:spPr bwMode="auto">
           <a:xfrm>
-            <a:off x="500035" y="2143116"/>
-            <a:ext cx="3719828" cy="4357718"/>
+            <a:off x="287483" y="1643050"/>
+            <a:ext cx="4146694" cy="4857784"/>
           </a:xfrm>
           <a:prstGeom prst="rect">
             <a:avLst/>
@@ -5477,8 +5459,8 @@
         </p:blipFill>
         <p:spPr bwMode="auto">
           <a:xfrm>
-            <a:off x="4902530" y="2143117"/>
-            <a:ext cx="3739295" cy="4357718"/>
+            <a:off x="4687744" y="1643050"/>
+            <a:ext cx="4170536" cy="4860280"/>
           </a:xfrm>
           <a:prstGeom prst="rect">
             <a:avLst/>
@@ -5492,6 +5474,80 @@
           </a:ln>
         </p:spPr>
       </p:pic>
+      <p:sp>
+        <p:nvSpPr>
+          <p:cNvPr id="5" name="Título 1"/>
+          <p:cNvSpPr txBox="1">
+            <a:spLocks/>
+          </p:cNvSpPr>
+          <p:nvPr/>
+        </p:nvSpPr>
+        <p:spPr>
+          <a:xfrm>
+            <a:off x="457200" y="785794"/>
+            <a:ext cx="8229600" cy="1066800"/>
+          </a:xfrm>
+          <a:prstGeom prst="rect">
+            <a:avLst/>
+          </a:prstGeom>
+        </p:spPr>
+        <p:txBody>
+          <a:bodyPr vert="horz" anchor="ctr">
+            <a:normAutofit/>
+          </a:bodyPr>
+          <a:lstStyle/>
+          <a:p>
+            <a:pPr marL="0" marR="0" lvl="0" indent="0" algn="l" defTabSz="914400" rtl="0" eaLnBrk="1" fontAlgn="auto" latinLnBrk="0" hangingPunct="1">
+              <a:lnSpc>
+                <a:spcPct val="100000"/>
+              </a:lnSpc>
+              <a:spcBef>
+                <a:spcPct val="0"/>
+              </a:spcBef>
+              <a:spcAft>
+                <a:spcPts val="0"/>
+              </a:spcAft>
+              <a:buClrTx/>
+              <a:buSzTx/>
+              <a:buFontTx/>
+              <a:buNone/>
+              <a:tabLst/>
+              <a:defRPr/>
+            </a:pPr>
+            <a:r>
+              <a:rPr kumimoji="0" lang="pt-BR" sz="2500" b="0" i="0" u="none" strike="noStrike" kern="1200" cap="none" spc="0" normalizeH="0" baseline="0" noProof="0" smtClean="0">
+                <a:ln>
+                  <a:noFill/>
+                </a:ln>
+                <a:solidFill>
+                  <a:schemeClr val="tx2"/>
+                </a:solidFill>
+                <a:effectLst/>
+                <a:uLnTx/>
+                <a:uFillTx/>
+                <a:latin typeface="+mj-lt"/>
+                <a:ea typeface="+mj-ea"/>
+                <a:cs typeface="+mj-cs"/>
+              </a:rPr>
+              <a:t>HARDWARE</a:t>
+            </a:r>
+            <a:endParaRPr kumimoji="0" lang="pt-BR" sz="2500" b="0" i="0" u="none" strike="noStrike" kern="1200" cap="none" spc="0" normalizeH="0" baseline="0" noProof="0" dirty="0">
+              <a:ln>
+                <a:noFill/>
+              </a:ln>
+              <a:solidFill>
+                <a:schemeClr val="tx2"/>
+              </a:solidFill>
+              <a:effectLst/>
+              <a:uLnTx/>
+              <a:uFillTx/>
+              <a:latin typeface="+mj-lt"/>
+              <a:ea typeface="+mj-ea"/>
+              <a:cs typeface="+mj-cs"/>
+            </a:endParaRPr>
+          </a:p>
+        </p:txBody>
+      </p:sp>
     </p:spTree>
   </p:cSld>
   <p:clrMapOvr>

</xml_diff>

<commit_message>
Inseridos na apresentação.pptx os códigos do transmissor e do receptor.
</commit_message>
<xml_diff>
--- a/documentos/apresentação.pptx
+++ b/documentos/apresentação.pptx
@@ -12,14 +12,18 @@
     <p:sldId id="268" r:id="rId6"/>
     <p:sldId id="269" r:id="rId7"/>
     <p:sldId id="270" r:id="rId8"/>
-    <p:sldId id="271" r:id="rId9"/>
-    <p:sldId id="272" r:id="rId10"/>
-    <p:sldId id="273" r:id="rId11"/>
-    <p:sldId id="266" r:id="rId12"/>
-    <p:sldId id="262" r:id="rId13"/>
-    <p:sldId id="263" r:id="rId14"/>
-    <p:sldId id="264" r:id="rId15"/>
-    <p:sldId id="274" r:id="rId16"/>
+    <p:sldId id="275" r:id="rId9"/>
+    <p:sldId id="271" r:id="rId10"/>
+    <p:sldId id="272" r:id="rId11"/>
+    <p:sldId id="273" r:id="rId12"/>
+    <p:sldId id="276" r:id="rId13"/>
+    <p:sldId id="277" r:id="rId14"/>
+    <p:sldId id="278" r:id="rId15"/>
+    <p:sldId id="266" r:id="rId16"/>
+    <p:sldId id="262" r:id="rId17"/>
+    <p:sldId id="263" r:id="rId18"/>
+    <p:sldId id="264" r:id="rId19"/>
+    <p:sldId id="274" r:id="rId20"/>
   </p:sldIdLst>
   <p:sldSz cx="9144000" cy="6858000" type="screen4x3"/>
   <p:notesSz cx="6858000" cy="9144000"/>
@@ -780,7 +784,7 @@
             <a:fld id="{2E700DB3-DBF0-4086-B675-117E7A9610B8}" type="datetimeFigureOut">
               <a:rPr lang="pt-BR" smtClean="0"/>
               <a:pPr/>
-              <a:t>27/06/2010</a:t>
+              <a:t>28/06/2010</a:t>
             </a:fld>
             <a:endParaRPr lang="pt-BR" dirty="0"/>
           </a:p>
@@ -965,7 +969,7 @@
             <a:fld id="{2E700DB3-DBF0-4086-B675-117E7A9610B8}" type="datetimeFigureOut">
               <a:rPr lang="pt-BR" smtClean="0"/>
               <a:pPr/>
-              <a:t>27/06/2010</a:t>
+              <a:t>28/06/2010</a:t>
             </a:fld>
             <a:endParaRPr lang="pt-BR" dirty="0"/>
           </a:p>
@@ -1142,7 +1146,7 @@
             <a:fld id="{2E700DB3-DBF0-4086-B675-117E7A9610B8}" type="datetimeFigureOut">
               <a:rPr lang="pt-BR" smtClean="0"/>
               <a:pPr/>
-              <a:t>27/06/2010</a:t>
+              <a:t>28/06/2010</a:t>
             </a:fld>
             <a:endParaRPr lang="pt-BR" dirty="0"/>
           </a:p>
@@ -1309,7 +1313,7 @@
             <a:fld id="{2E700DB3-DBF0-4086-B675-117E7A9610B8}" type="datetimeFigureOut">
               <a:rPr lang="pt-BR" smtClean="0"/>
               <a:pPr/>
-              <a:t>27/06/2010</a:t>
+              <a:t>28/06/2010</a:t>
             </a:fld>
             <a:endParaRPr lang="pt-BR" dirty="0"/>
           </a:p>
@@ -1532,7 +1536,7 @@
             <a:fld id="{2E700DB3-DBF0-4086-B675-117E7A9610B8}" type="datetimeFigureOut">
               <a:rPr lang="pt-BR" smtClean="0"/>
               <a:pPr/>
-              <a:t>27/06/2010</a:t>
+              <a:t>28/06/2010</a:t>
             </a:fld>
             <a:endParaRPr lang="pt-BR" dirty="0"/>
           </a:p>
@@ -1793,7 +1797,7 @@
             <a:fld id="{2E700DB3-DBF0-4086-B675-117E7A9610B8}" type="datetimeFigureOut">
               <a:rPr lang="pt-BR" smtClean="0"/>
               <a:pPr/>
-              <a:t>27/06/2010</a:t>
+              <a:t>28/06/2010</a:t>
             </a:fld>
             <a:endParaRPr lang="pt-BR" dirty="0"/>
           </a:p>
@@ -2199,7 +2203,7 @@
             <a:fld id="{2E700DB3-DBF0-4086-B675-117E7A9610B8}" type="datetimeFigureOut">
               <a:rPr lang="pt-BR" smtClean="0"/>
               <a:pPr/>
-              <a:t>27/06/2010</a:t>
+              <a:t>28/06/2010</a:t>
             </a:fld>
             <a:endParaRPr lang="pt-BR" dirty="0"/>
           </a:p>
@@ -2332,7 +2336,7 @@
             <a:fld id="{2E700DB3-DBF0-4086-B675-117E7A9610B8}" type="datetimeFigureOut">
               <a:rPr lang="pt-BR" smtClean="0"/>
               <a:pPr/>
-              <a:t>27/06/2010</a:t>
+              <a:t>28/06/2010</a:t>
             </a:fld>
             <a:endParaRPr lang="pt-BR" dirty="0"/>
           </a:p>
@@ -2434,7 +2438,7 @@
             <a:fld id="{2E700DB3-DBF0-4086-B675-117E7A9610B8}" type="datetimeFigureOut">
               <a:rPr lang="pt-BR" smtClean="0"/>
               <a:pPr/>
-              <a:t>27/06/2010</a:t>
+              <a:t>28/06/2010</a:t>
             </a:fld>
             <a:endParaRPr lang="pt-BR" dirty="0"/>
           </a:p>
@@ -2681,7 +2685,7 @@
             <a:fld id="{2E700DB3-DBF0-4086-B675-117E7A9610B8}" type="datetimeFigureOut">
               <a:rPr lang="pt-BR" smtClean="0"/>
               <a:pPr/>
-              <a:t>27/06/2010</a:t>
+              <a:t>28/06/2010</a:t>
             </a:fld>
             <a:endParaRPr lang="pt-BR" dirty="0"/>
           </a:p>
@@ -2927,7 +2931,7 @@
             <a:fld id="{2E700DB3-DBF0-4086-B675-117E7A9610B8}" type="datetimeFigureOut">
               <a:rPr lang="pt-BR" smtClean="0"/>
               <a:pPr/>
-              <a:t>27/06/2010</a:t>
+              <a:t>28/06/2010</a:t>
             </a:fld>
             <a:endParaRPr lang="pt-BR" dirty="0"/>
           </a:p>
@@ -3753,7 +3757,7 @@
             <a:fld id="{2E700DB3-DBF0-4086-B675-117E7A9610B8}" type="datetimeFigureOut">
               <a:rPr lang="pt-BR" smtClean="0"/>
               <a:pPr/>
-              <a:t>27/06/2010</a:t>
+              <a:t>28/06/2010</a:t>
             </a:fld>
             <a:endParaRPr lang="pt-BR" dirty="0"/>
           </a:p>
@@ -4271,7 +4275,11 @@
           <a:p>
             <a:r>
               <a:rPr lang="pt-BR" sz="2500" dirty="0" smtClean="0"/>
-              <a:t>FIRMWARE</a:t>
+              <a:t>FIRMWARE - </a:t>
+            </a:r>
+            <a:r>
+              <a:rPr lang="pt-BR" sz="2500" dirty="0" smtClean="0"/>
+              <a:t>TRANSMISSOR</a:t>
             </a:r>
             <a:endParaRPr lang="pt-BR" sz="2500" dirty="0"/>
           </a:p>
@@ -4279,7 +4287,7 @@
       </p:sp>
       <p:pic>
         <p:nvPicPr>
-          <p:cNvPr id="12290" name="Picture 2"/>
+          <p:cNvPr id="11266" name="Picture 2"/>
           <p:cNvPicPr>
             <a:picLocks noChangeAspect="1" noChangeArrowheads="1"/>
           </p:cNvPicPr>
@@ -4294,8 +4302,8 @@
         </p:blipFill>
         <p:spPr bwMode="auto">
           <a:xfrm>
-            <a:off x="2571736" y="2285992"/>
-            <a:ext cx="3800475" cy="1666875"/>
+            <a:off x="571472" y="3214686"/>
+            <a:ext cx="3543300" cy="2152650"/>
           </a:xfrm>
           <a:prstGeom prst="rect">
             <a:avLst/>
@@ -4311,7 +4319,7 @@
       </p:pic>
       <p:pic>
         <p:nvPicPr>
-          <p:cNvPr id="12291" name="Picture 3"/>
+          <p:cNvPr id="11267" name="Picture 3"/>
           <p:cNvPicPr>
             <a:picLocks noChangeAspect="1" noChangeArrowheads="1"/>
           </p:cNvPicPr>
@@ -4326,8 +4334,8 @@
         </p:blipFill>
         <p:spPr bwMode="auto">
           <a:xfrm>
-            <a:off x="1571604" y="4429132"/>
-            <a:ext cx="5734050" cy="1981200"/>
+            <a:off x="4486303" y="3214686"/>
+            <a:ext cx="4086225" cy="2152650"/>
           </a:xfrm>
           <a:prstGeom prst="rect">
             <a:avLst/>
@@ -4392,51 +4400,23 @@
           <a:p>
             <a:r>
               <a:rPr lang="pt-BR" sz="2500" dirty="0" smtClean="0"/>
-              <a:t>REPOSITÓRIO E CONTROLE DE VERSÃO</a:t>
+              <a:t>FIRMWARE - </a:t>
+            </a:r>
+            <a:r>
+              <a:rPr lang="pt-BR" sz="2500" dirty="0" smtClean="0"/>
+              <a:t>TRANSMISSOR</a:t>
             </a:r>
             <a:endParaRPr lang="pt-BR" sz="2500" dirty="0"/>
-          </a:p>
-        </p:txBody>
-      </p:sp>
-      <p:sp>
-        <p:nvSpPr>
-          <p:cNvPr id="5" name="Retângulo 4"/>
-          <p:cNvSpPr/>
-          <p:nvPr/>
-        </p:nvSpPr>
-        <p:spPr>
-          <a:xfrm>
-            <a:off x="1428760" y="2059536"/>
-            <a:ext cx="6072198" cy="338554"/>
-          </a:xfrm>
-          <a:prstGeom prst="rect">
-            <a:avLst/>
-          </a:prstGeom>
-        </p:spPr>
-        <p:txBody>
-          <a:bodyPr wrap="square">
-            <a:spAutoFit/>
-          </a:bodyPr>
-          <a:lstStyle/>
-          <a:p>
-            <a:pPr algn="ctr"/>
-            <a:r>
-              <a:rPr lang="pt-BR" sz="1600" u="sng" dirty="0" smtClean="0"/>
-              <a:t>http://code.google.com/p/msp430-remote-control-car/</a:t>
-            </a:r>
-            <a:endParaRPr lang="pt-BR" sz="1600" u="sng" dirty="0"/>
           </a:p>
         </p:txBody>
       </p:sp>
       <p:pic>
         <p:nvPicPr>
-          <p:cNvPr id="1027" name="Picture 3"/>
+          <p:cNvPr id="12290" name="Picture 2"/>
           <p:cNvPicPr>
-            <a:picLocks noGrp="1" noChangeAspect="1" noChangeArrowheads="1"/>
+            <a:picLocks noChangeAspect="1" noChangeArrowheads="1"/>
           </p:cNvPicPr>
-          <p:nvPr>
-            <p:ph idx="1"/>
-          </p:nvPr>
+          <p:nvPr/>
         </p:nvPicPr>
         <p:blipFill>
           <a:blip r:embed="rId2" cstate="print"/>
@@ -4447,8 +4427,40 @@
         </p:blipFill>
         <p:spPr bwMode="auto">
           <a:xfrm>
-            <a:off x="1357313" y="2506581"/>
-            <a:ext cx="6429375" cy="4175289"/>
+            <a:off x="2571736" y="2285992"/>
+            <a:ext cx="3800475" cy="1666875"/>
+          </a:xfrm>
+          <a:prstGeom prst="rect">
+            <a:avLst/>
+          </a:prstGeom>
+          <a:noFill/>
+          <a:ln w="9525">
+            <a:noFill/>
+            <a:miter lim="800000"/>
+            <a:headEnd/>
+            <a:tailEnd/>
+          </a:ln>
+        </p:spPr>
+      </p:pic>
+      <p:pic>
+        <p:nvPicPr>
+          <p:cNvPr id="12291" name="Picture 3"/>
+          <p:cNvPicPr>
+            <a:picLocks noChangeAspect="1" noChangeArrowheads="1"/>
+          </p:cNvPicPr>
+          <p:nvPr/>
+        </p:nvPicPr>
+        <p:blipFill>
+          <a:blip r:embed="rId3" cstate="print"/>
+          <a:srcRect/>
+          <a:stretch>
+            <a:fillRect/>
+          </a:stretch>
+        </p:blipFill>
+        <p:spPr bwMode="auto">
+          <a:xfrm>
+            <a:off x="1571604" y="4429132"/>
+            <a:ext cx="5734050" cy="1981200"/>
           </a:xfrm>
           <a:prstGeom prst="rect">
             <a:avLst/>
@@ -4513,7 +4525,11 @@
           <a:p>
             <a:r>
               <a:rPr lang="pt-BR" sz="2500" dirty="0" smtClean="0"/>
-              <a:t>REPOSITÓRIO E CONTROLE DE VERSÃO</a:t>
+              <a:t>FIRMWARE - </a:t>
+            </a:r>
+            <a:r>
+              <a:rPr lang="pt-BR" sz="2500" dirty="0" smtClean="0"/>
+              <a:t>TRANSMISSOR</a:t>
             </a:r>
             <a:endParaRPr lang="pt-BR" sz="2500" dirty="0"/>
           </a:p>
@@ -4521,13 +4537,11 @@
       </p:sp>
       <p:pic>
         <p:nvPicPr>
-          <p:cNvPr id="3074" name="Picture 2"/>
+          <p:cNvPr id="2050" name="Picture 2"/>
           <p:cNvPicPr>
-            <a:picLocks noGrp="1" noChangeAspect="1" noChangeArrowheads="1"/>
+            <a:picLocks noChangeAspect="1" noChangeArrowheads="1"/>
           </p:cNvPicPr>
-          <p:nvPr>
-            <p:ph idx="1"/>
-          </p:nvPr>
+          <p:nvPr/>
         </p:nvPicPr>
         <p:blipFill>
           <a:blip r:embed="rId2" cstate="print"/>
@@ -4538,8 +4552,8 @@
         </p:blipFill>
         <p:spPr bwMode="auto">
           <a:xfrm>
-            <a:off x="1532871" y="2071678"/>
-            <a:ext cx="6110963" cy="4500594"/>
+            <a:off x="2724150" y="2562243"/>
+            <a:ext cx="3695700" cy="3438525"/>
           </a:xfrm>
           <a:prstGeom prst="rect">
             <a:avLst/>
@@ -4604,7 +4618,7 @@
           <a:p>
             <a:r>
               <a:rPr lang="pt-BR" sz="2500" dirty="0" smtClean="0"/>
-              <a:t>REPOSITÓRIO E CONTROLE DE VERSÃO</a:t>
+              <a:t>FIRMWARE - RECEPTOR </a:t>
             </a:r>
             <a:endParaRPr lang="pt-BR" sz="2500" dirty="0"/>
           </a:p>
@@ -4612,13 +4626,11 @@
       </p:sp>
       <p:pic>
         <p:nvPicPr>
-          <p:cNvPr id="2051" name="Picture 3"/>
+          <p:cNvPr id="3074" name="Picture 2"/>
           <p:cNvPicPr>
-            <a:picLocks noGrp="1" noChangeAspect="1" noChangeArrowheads="1"/>
+            <a:picLocks noChangeAspect="1" noChangeArrowheads="1"/>
           </p:cNvPicPr>
-          <p:nvPr>
-            <p:ph idx="1"/>
-          </p:nvPr>
+          <p:nvPr/>
         </p:nvPicPr>
         <p:blipFill>
           <a:blip r:embed="rId2" cstate="print"/>
@@ -4629,40 +4641,8 @@
         </p:blipFill>
         <p:spPr bwMode="auto">
           <a:xfrm>
-            <a:off x="1285852" y="2786058"/>
-            <a:ext cx="6572296" cy="3856918"/>
-          </a:xfrm>
-          <a:prstGeom prst="rect">
-            <a:avLst/>
-          </a:prstGeom>
-          <a:noFill/>
-          <a:ln w="9525">
-            <a:noFill/>
-            <a:miter lim="800000"/>
-            <a:headEnd/>
-            <a:tailEnd/>
-          </a:ln>
-        </p:spPr>
-      </p:pic>
-      <p:pic>
-        <p:nvPicPr>
-          <p:cNvPr id="4099" name="Picture 3"/>
-          <p:cNvPicPr>
-            <a:picLocks noChangeAspect="1" noChangeArrowheads="1"/>
-          </p:cNvPicPr>
-          <p:nvPr/>
-        </p:nvPicPr>
-        <p:blipFill>
-          <a:blip r:embed="rId3" cstate="print"/>
-          <a:srcRect/>
-          <a:stretch>
-            <a:fillRect/>
-          </a:stretch>
-        </p:blipFill>
-        <p:spPr bwMode="auto">
-          <a:xfrm>
-            <a:off x="3000364" y="2030362"/>
-            <a:ext cx="3367095" cy="684258"/>
+            <a:off x="2528888" y="2214554"/>
+            <a:ext cx="4086225" cy="4048125"/>
           </a:xfrm>
           <a:prstGeom prst="rect">
             <a:avLst/>
@@ -4727,87 +4707,44 @@
           <a:p>
             <a:r>
               <a:rPr lang="pt-BR" sz="2500" dirty="0" smtClean="0"/>
-              <a:t>DIFICULDADES</a:t>
+              <a:t>FIRMWARE - RECEPTOR </a:t>
             </a:r>
             <a:endParaRPr lang="pt-BR" sz="2500" dirty="0"/>
           </a:p>
         </p:txBody>
       </p:sp>
-      <p:sp>
-        <p:nvSpPr>
-          <p:cNvPr id="5" name="Espaço Reservado para Conteúdo 4"/>
-          <p:cNvSpPr>
-            <a:spLocks noGrp="1"/>
-          </p:cNvSpPr>
-          <p:nvPr>
-            <p:ph idx="1"/>
-          </p:nvPr>
-        </p:nvSpPr>
-        <p:spPr/>
-        <p:txBody>
-          <a:bodyPr>
-            <a:normAutofit lnSpcReduction="10000"/>
-          </a:bodyPr>
-          <a:lstStyle/>
-          <a:p>
-            <a:r>
-              <a:rPr lang="pt-BR" sz="2200" dirty="0" smtClean="0"/>
-              <a:t>Compra de componentes.</a:t>
-            </a:r>
-          </a:p>
-          <a:p>
-            <a:r>
-              <a:rPr lang="pt-BR" sz="2200" dirty="0" smtClean="0"/>
-              <a:t>Soldagem do acelerômetro.</a:t>
-            </a:r>
-          </a:p>
-          <a:p>
-            <a:r>
-              <a:rPr lang="pt-BR" sz="2200" dirty="0" smtClean="0"/>
-              <a:t>Reuso da biblioteca RF da Texas Instruments.</a:t>
-            </a:r>
-          </a:p>
-          <a:p>
-            <a:r>
-              <a:rPr lang="pt-BR" sz="2200" dirty="0" smtClean="0"/>
-              <a:t>Desenvolver um código onde funcionam simultaneamente o RF e o acelerômetro.</a:t>
-            </a:r>
-          </a:p>
-          <a:p>
-            <a:r>
-              <a:rPr lang="pt-BR" sz="2200" dirty="0" smtClean="0"/>
-              <a:t>Falha nas pilhas do kit de desenvolvimento eZ430-RF2500.</a:t>
-            </a:r>
-          </a:p>
-          <a:p>
-            <a:r>
-              <a:rPr lang="pt-BR" sz="2200" dirty="0" smtClean="0"/>
-              <a:t>A documentação do acelerômetro demonstrou uma leitura difícil e com poucas explicações em algumas seções.</a:t>
-            </a:r>
-          </a:p>
-          <a:p>
-            <a:r>
-              <a:rPr lang="pt-BR" sz="2200" dirty="0" smtClean="0"/>
-              <a:t>A documentação do MSP430 não tem informações suficientes sobre o funcionamento da interface SPI a 3 </a:t>
-            </a:r>
-            <a:r>
-              <a:rPr lang="pt-BR" sz="2200" dirty="0" smtClean="0"/>
-              <a:t>fios</a:t>
-            </a:r>
-            <a:r>
-              <a:rPr lang="pt-BR" sz="2200" dirty="0" smtClean="0"/>
-              <a:t>.</a:t>
-            </a:r>
-          </a:p>
-          <a:p>
-            <a:r>
-              <a:rPr lang="pt-BR" sz="2200" dirty="0" smtClean="0"/>
-              <a:t>A documentação do acelerômetro contém um algoritmo de leitura/escrita que mostrou não ser adequado para funcionar no modo SPI a 3 fios.</a:t>
-            </a:r>
-            <a:endParaRPr lang="pt-BR" sz="2200" dirty="0"/>
-          </a:p>
-        </p:txBody>
-      </p:sp>
+      <p:pic>
+        <p:nvPicPr>
+          <p:cNvPr id="4098" name="Picture 2"/>
+          <p:cNvPicPr>
+            <a:picLocks noChangeAspect="1" noChangeArrowheads="1"/>
+          </p:cNvPicPr>
+          <p:nvPr/>
+        </p:nvPicPr>
+        <p:blipFill>
+          <a:blip r:embed="rId2" cstate="print"/>
+          <a:srcRect/>
+          <a:stretch>
+            <a:fillRect/>
+          </a:stretch>
+        </p:blipFill>
+        <p:spPr bwMode="auto">
+          <a:xfrm>
+            <a:off x="1152525" y="2090759"/>
+            <a:ext cx="6838950" cy="4410075"/>
+          </a:xfrm>
+          <a:prstGeom prst="rect">
+            <a:avLst/>
+          </a:prstGeom>
+          <a:noFill/>
+          <a:ln w="9525">
+            <a:noFill/>
+            <a:miter lim="800000"/>
+            <a:headEnd/>
+            <a:tailEnd/>
+          </a:ln>
+        </p:spPr>
+      </p:pic>
     </p:spTree>
   </p:cSld>
   <p:clrMapOvr>
@@ -4824,6 +4761,465 @@
 </file>
 
 <file path=ppt/slides/slide15.xml><?xml version="1.0" encoding="utf-8"?>
+<p:sld xmlns:a="http://schemas.openxmlformats.org/drawingml/2006/main" xmlns:r="http://schemas.openxmlformats.org/officeDocument/2006/relationships" xmlns:p="http://schemas.openxmlformats.org/presentationml/2006/main">
+  <p:cSld>
+    <p:spTree>
+      <p:nvGrpSpPr>
+        <p:cNvPr id="1" name=""/>
+        <p:cNvGrpSpPr/>
+        <p:nvPr/>
+      </p:nvGrpSpPr>
+      <p:grpSpPr>
+        <a:xfrm>
+          <a:off x="0" y="0"/>
+          <a:ext cx="0" cy="0"/>
+          <a:chOff x="0" y="0"/>
+          <a:chExt cx="0" cy="0"/>
+        </a:xfrm>
+      </p:grpSpPr>
+      <p:sp>
+        <p:nvSpPr>
+          <p:cNvPr id="2" name="Título 1"/>
+          <p:cNvSpPr>
+            <a:spLocks noGrp="1"/>
+          </p:cNvSpPr>
+          <p:nvPr>
+            <p:ph type="title"/>
+          </p:nvPr>
+        </p:nvSpPr>
+        <p:spPr/>
+        <p:txBody>
+          <a:bodyPr>
+            <a:normAutofit/>
+          </a:bodyPr>
+          <a:lstStyle/>
+          <a:p>
+            <a:r>
+              <a:rPr lang="pt-BR" sz="2500" dirty="0" smtClean="0"/>
+              <a:t>REPOSITÓRIO E CONTROLE DE VERSÃO</a:t>
+            </a:r>
+            <a:endParaRPr lang="pt-BR" sz="2500" dirty="0"/>
+          </a:p>
+        </p:txBody>
+      </p:sp>
+      <p:sp>
+        <p:nvSpPr>
+          <p:cNvPr id="5" name="Retângulo 4"/>
+          <p:cNvSpPr/>
+          <p:nvPr/>
+        </p:nvSpPr>
+        <p:spPr>
+          <a:xfrm>
+            <a:off x="1428760" y="2059536"/>
+            <a:ext cx="6072198" cy="338554"/>
+          </a:xfrm>
+          <a:prstGeom prst="rect">
+            <a:avLst/>
+          </a:prstGeom>
+        </p:spPr>
+        <p:txBody>
+          <a:bodyPr wrap="square">
+            <a:spAutoFit/>
+          </a:bodyPr>
+          <a:lstStyle/>
+          <a:p>
+            <a:pPr algn="ctr"/>
+            <a:r>
+              <a:rPr lang="pt-BR" sz="1600" u="sng" dirty="0" smtClean="0"/>
+              <a:t>http://code.google.com/p/msp430-remote-control-car/</a:t>
+            </a:r>
+            <a:endParaRPr lang="pt-BR" sz="1600" u="sng" dirty="0"/>
+          </a:p>
+        </p:txBody>
+      </p:sp>
+      <p:pic>
+        <p:nvPicPr>
+          <p:cNvPr id="1027" name="Picture 3"/>
+          <p:cNvPicPr>
+            <a:picLocks noGrp="1" noChangeAspect="1" noChangeArrowheads="1"/>
+          </p:cNvPicPr>
+          <p:nvPr>
+            <p:ph idx="1"/>
+          </p:nvPr>
+        </p:nvPicPr>
+        <p:blipFill>
+          <a:blip r:embed="rId2" cstate="print"/>
+          <a:srcRect/>
+          <a:stretch>
+            <a:fillRect/>
+          </a:stretch>
+        </p:blipFill>
+        <p:spPr bwMode="auto">
+          <a:xfrm>
+            <a:off x="1357313" y="2506581"/>
+            <a:ext cx="6429375" cy="4175289"/>
+          </a:xfrm>
+          <a:prstGeom prst="rect">
+            <a:avLst/>
+          </a:prstGeom>
+          <a:noFill/>
+          <a:ln w="9525">
+            <a:noFill/>
+            <a:miter lim="800000"/>
+            <a:headEnd/>
+            <a:tailEnd/>
+          </a:ln>
+        </p:spPr>
+      </p:pic>
+    </p:spTree>
+  </p:cSld>
+  <p:clrMapOvr>
+    <a:masterClrMapping/>
+  </p:clrMapOvr>
+  <p:timing>
+    <p:tnLst>
+      <p:par>
+        <p:cTn id="1" dur="indefinite" restart="never" nodeType="tmRoot"/>
+      </p:par>
+    </p:tnLst>
+  </p:timing>
+</p:sld>
+</file>
+
+<file path=ppt/slides/slide16.xml><?xml version="1.0" encoding="utf-8"?>
+<p:sld xmlns:a="http://schemas.openxmlformats.org/drawingml/2006/main" xmlns:r="http://schemas.openxmlformats.org/officeDocument/2006/relationships" xmlns:p="http://schemas.openxmlformats.org/presentationml/2006/main">
+  <p:cSld>
+    <p:spTree>
+      <p:nvGrpSpPr>
+        <p:cNvPr id="1" name=""/>
+        <p:cNvGrpSpPr/>
+        <p:nvPr/>
+      </p:nvGrpSpPr>
+      <p:grpSpPr>
+        <a:xfrm>
+          <a:off x="0" y="0"/>
+          <a:ext cx="0" cy="0"/>
+          <a:chOff x="0" y="0"/>
+          <a:chExt cx="0" cy="0"/>
+        </a:xfrm>
+      </p:grpSpPr>
+      <p:sp>
+        <p:nvSpPr>
+          <p:cNvPr id="2" name="Título 1"/>
+          <p:cNvSpPr>
+            <a:spLocks noGrp="1"/>
+          </p:cNvSpPr>
+          <p:nvPr>
+            <p:ph type="title"/>
+          </p:nvPr>
+        </p:nvSpPr>
+        <p:spPr/>
+        <p:txBody>
+          <a:bodyPr>
+            <a:normAutofit/>
+          </a:bodyPr>
+          <a:lstStyle/>
+          <a:p>
+            <a:r>
+              <a:rPr lang="pt-BR" sz="2500" dirty="0" smtClean="0"/>
+              <a:t>REPOSITÓRIO E CONTROLE DE VERSÃO</a:t>
+            </a:r>
+            <a:endParaRPr lang="pt-BR" sz="2500" dirty="0"/>
+          </a:p>
+        </p:txBody>
+      </p:sp>
+      <p:pic>
+        <p:nvPicPr>
+          <p:cNvPr id="3074" name="Picture 2"/>
+          <p:cNvPicPr>
+            <a:picLocks noGrp="1" noChangeAspect="1" noChangeArrowheads="1"/>
+          </p:cNvPicPr>
+          <p:nvPr>
+            <p:ph idx="1"/>
+          </p:nvPr>
+        </p:nvPicPr>
+        <p:blipFill>
+          <a:blip r:embed="rId2" cstate="print"/>
+          <a:srcRect/>
+          <a:stretch>
+            <a:fillRect/>
+          </a:stretch>
+        </p:blipFill>
+        <p:spPr bwMode="auto">
+          <a:xfrm>
+            <a:off x="1532871" y="2071678"/>
+            <a:ext cx="6110963" cy="4500594"/>
+          </a:xfrm>
+          <a:prstGeom prst="rect">
+            <a:avLst/>
+          </a:prstGeom>
+          <a:noFill/>
+          <a:ln w="9525">
+            <a:noFill/>
+            <a:miter lim="800000"/>
+            <a:headEnd/>
+            <a:tailEnd/>
+          </a:ln>
+        </p:spPr>
+      </p:pic>
+    </p:spTree>
+  </p:cSld>
+  <p:clrMapOvr>
+    <a:masterClrMapping/>
+  </p:clrMapOvr>
+  <p:timing>
+    <p:tnLst>
+      <p:par>
+        <p:cTn id="1" dur="indefinite" restart="never" nodeType="tmRoot"/>
+      </p:par>
+    </p:tnLst>
+  </p:timing>
+</p:sld>
+</file>
+
+<file path=ppt/slides/slide17.xml><?xml version="1.0" encoding="utf-8"?>
+<p:sld xmlns:a="http://schemas.openxmlformats.org/drawingml/2006/main" xmlns:r="http://schemas.openxmlformats.org/officeDocument/2006/relationships" xmlns:p="http://schemas.openxmlformats.org/presentationml/2006/main">
+  <p:cSld>
+    <p:spTree>
+      <p:nvGrpSpPr>
+        <p:cNvPr id="1" name=""/>
+        <p:cNvGrpSpPr/>
+        <p:nvPr/>
+      </p:nvGrpSpPr>
+      <p:grpSpPr>
+        <a:xfrm>
+          <a:off x="0" y="0"/>
+          <a:ext cx="0" cy="0"/>
+          <a:chOff x="0" y="0"/>
+          <a:chExt cx="0" cy="0"/>
+        </a:xfrm>
+      </p:grpSpPr>
+      <p:sp>
+        <p:nvSpPr>
+          <p:cNvPr id="2" name="Título 1"/>
+          <p:cNvSpPr>
+            <a:spLocks noGrp="1"/>
+          </p:cNvSpPr>
+          <p:nvPr>
+            <p:ph type="title"/>
+          </p:nvPr>
+        </p:nvSpPr>
+        <p:spPr/>
+        <p:txBody>
+          <a:bodyPr>
+            <a:normAutofit/>
+          </a:bodyPr>
+          <a:lstStyle/>
+          <a:p>
+            <a:r>
+              <a:rPr lang="pt-BR" sz="2500" dirty="0" smtClean="0"/>
+              <a:t>REPOSITÓRIO E CONTROLE DE VERSÃO</a:t>
+            </a:r>
+            <a:endParaRPr lang="pt-BR" sz="2500" dirty="0"/>
+          </a:p>
+        </p:txBody>
+      </p:sp>
+      <p:pic>
+        <p:nvPicPr>
+          <p:cNvPr id="2051" name="Picture 3"/>
+          <p:cNvPicPr>
+            <a:picLocks noGrp="1" noChangeAspect="1" noChangeArrowheads="1"/>
+          </p:cNvPicPr>
+          <p:nvPr>
+            <p:ph idx="1"/>
+          </p:nvPr>
+        </p:nvPicPr>
+        <p:blipFill>
+          <a:blip r:embed="rId2" cstate="print"/>
+          <a:srcRect/>
+          <a:stretch>
+            <a:fillRect/>
+          </a:stretch>
+        </p:blipFill>
+        <p:spPr bwMode="auto">
+          <a:xfrm>
+            <a:off x="1285852" y="2786058"/>
+            <a:ext cx="6572296" cy="3856918"/>
+          </a:xfrm>
+          <a:prstGeom prst="rect">
+            <a:avLst/>
+          </a:prstGeom>
+          <a:noFill/>
+          <a:ln w="9525">
+            <a:noFill/>
+            <a:miter lim="800000"/>
+            <a:headEnd/>
+            <a:tailEnd/>
+          </a:ln>
+        </p:spPr>
+      </p:pic>
+      <p:pic>
+        <p:nvPicPr>
+          <p:cNvPr id="4099" name="Picture 3"/>
+          <p:cNvPicPr>
+            <a:picLocks noChangeAspect="1" noChangeArrowheads="1"/>
+          </p:cNvPicPr>
+          <p:nvPr/>
+        </p:nvPicPr>
+        <p:blipFill>
+          <a:blip r:embed="rId3" cstate="print"/>
+          <a:srcRect/>
+          <a:stretch>
+            <a:fillRect/>
+          </a:stretch>
+        </p:blipFill>
+        <p:spPr bwMode="auto">
+          <a:xfrm>
+            <a:off x="3000364" y="2030362"/>
+            <a:ext cx="3367095" cy="684258"/>
+          </a:xfrm>
+          <a:prstGeom prst="rect">
+            <a:avLst/>
+          </a:prstGeom>
+          <a:noFill/>
+          <a:ln w="9525">
+            <a:noFill/>
+            <a:miter lim="800000"/>
+            <a:headEnd/>
+            <a:tailEnd/>
+          </a:ln>
+        </p:spPr>
+      </p:pic>
+    </p:spTree>
+  </p:cSld>
+  <p:clrMapOvr>
+    <a:masterClrMapping/>
+  </p:clrMapOvr>
+  <p:timing>
+    <p:tnLst>
+      <p:par>
+        <p:cTn id="1" dur="indefinite" restart="never" nodeType="tmRoot"/>
+      </p:par>
+    </p:tnLst>
+  </p:timing>
+</p:sld>
+</file>
+
+<file path=ppt/slides/slide18.xml><?xml version="1.0" encoding="utf-8"?>
+<p:sld xmlns:a="http://schemas.openxmlformats.org/drawingml/2006/main" xmlns:r="http://schemas.openxmlformats.org/officeDocument/2006/relationships" xmlns:p="http://schemas.openxmlformats.org/presentationml/2006/main">
+  <p:cSld>
+    <p:spTree>
+      <p:nvGrpSpPr>
+        <p:cNvPr id="1" name=""/>
+        <p:cNvGrpSpPr/>
+        <p:nvPr/>
+      </p:nvGrpSpPr>
+      <p:grpSpPr>
+        <a:xfrm>
+          <a:off x="0" y="0"/>
+          <a:ext cx="0" cy="0"/>
+          <a:chOff x="0" y="0"/>
+          <a:chExt cx="0" cy="0"/>
+        </a:xfrm>
+      </p:grpSpPr>
+      <p:sp>
+        <p:nvSpPr>
+          <p:cNvPr id="2" name="Título 1"/>
+          <p:cNvSpPr>
+            <a:spLocks noGrp="1"/>
+          </p:cNvSpPr>
+          <p:nvPr>
+            <p:ph type="title"/>
+          </p:nvPr>
+        </p:nvSpPr>
+        <p:spPr/>
+        <p:txBody>
+          <a:bodyPr>
+            <a:normAutofit/>
+          </a:bodyPr>
+          <a:lstStyle/>
+          <a:p>
+            <a:r>
+              <a:rPr lang="pt-BR" sz="2500" dirty="0" smtClean="0"/>
+              <a:t>DIFICULDADES</a:t>
+            </a:r>
+            <a:endParaRPr lang="pt-BR" sz="2500" dirty="0"/>
+          </a:p>
+        </p:txBody>
+      </p:sp>
+      <p:sp>
+        <p:nvSpPr>
+          <p:cNvPr id="5" name="Espaço Reservado para Conteúdo 4"/>
+          <p:cNvSpPr>
+            <a:spLocks noGrp="1"/>
+          </p:cNvSpPr>
+          <p:nvPr>
+            <p:ph idx="1"/>
+          </p:nvPr>
+        </p:nvSpPr>
+        <p:spPr/>
+        <p:txBody>
+          <a:bodyPr>
+            <a:normAutofit lnSpcReduction="10000"/>
+          </a:bodyPr>
+          <a:lstStyle/>
+          <a:p>
+            <a:r>
+              <a:rPr lang="pt-BR" sz="2200" dirty="0" smtClean="0"/>
+              <a:t>Compra de componentes.</a:t>
+            </a:r>
+          </a:p>
+          <a:p>
+            <a:r>
+              <a:rPr lang="pt-BR" sz="2200" dirty="0" smtClean="0"/>
+              <a:t>Soldagem do acelerômetro.</a:t>
+            </a:r>
+          </a:p>
+          <a:p>
+            <a:r>
+              <a:rPr lang="pt-BR" sz="2200" dirty="0" smtClean="0"/>
+              <a:t>Reuso da biblioteca RF da Texas Instruments.</a:t>
+            </a:r>
+          </a:p>
+          <a:p>
+            <a:r>
+              <a:rPr lang="pt-BR" sz="2200" dirty="0" smtClean="0"/>
+              <a:t>Desenvolver um código onde funcionam simultaneamente o RF e o acelerômetro.</a:t>
+            </a:r>
+          </a:p>
+          <a:p>
+            <a:r>
+              <a:rPr lang="pt-BR" sz="2200" dirty="0" smtClean="0"/>
+              <a:t>Falha nas pilhas do kit de desenvolvimento eZ430-RF2500.</a:t>
+            </a:r>
+          </a:p>
+          <a:p>
+            <a:r>
+              <a:rPr lang="pt-BR" sz="2200" dirty="0" smtClean="0"/>
+              <a:t>A documentação do acelerômetro demonstrou uma leitura difícil e com poucas explicações em algumas seções.</a:t>
+            </a:r>
+          </a:p>
+          <a:p>
+            <a:r>
+              <a:rPr lang="pt-BR" sz="2200" dirty="0" smtClean="0"/>
+              <a:t>A documentação do MSP430 não tem informações suficientes sobre o funcionamento da interface SPI a 3 fios.</a:t>
+            </a:r>
+          </a:p>
+          <a:p>
+            <a:r>
+              <a:rPr lang="pt-BR" sz="2200" dirty="0" smtClean="0"/>
+              <a:t>A documentação do acelerômetro contém um algoritmo de leitura/escrita que mostrou não ser adequado para funcionar no modo SPI a 3 fios.</a:t>
+            </a:r>
+            <a:endParaRPr lang="pt-BR" sz="2200" dirty="0"/>
+          </a:p>
+        </p:txBody>
+      </p:sp>
+    </p:spTree>
+  </p:cSld>
+  <p:clrMapOvr>
+    <a:masterClrMapping/>
+  </p:clrMapOvr>
+  <p:timing>
+    <p:tnLst>
+      <p:par>
+        <p:cTn id="1" dur="indefinite" restart="never" nodeType="tmRoot"/>
+      </p:par>
+    </p:tnLst>
+  </p:timing>
+</p:sld>
+</file>
+
+<file path=ppt/slides/slide19.xml><?xml version="1.0" encoding="utf-8"?>
 <p:sld xmlns:a="http://schemas.openxmlformats.org/drawingml/2006/main" xmlns:r="http://schemas.openxmlformats.org/officeDocument/2006/relationships" xmlns:p="http://schemas.openxmlformats.org/presentationml/2006/main">
   <p:cSld>
     <p:spTree>
@@ -5836,7 +6232,11 @@
           <a:p>
             <a:r>
               <a:rPr lang="pt-BR" sz="2500" dirty="0" smtClean="0"/>
-              <a:t>FIRMWARE</a:t>
+              <a:t>FIRMWARE - </a:t>
+            </a:r>
+            <a:r>
+              <a:rPr lang="pt-BR" sz="2500" dirty="0" smtClean="0"/>
+              <a:t>TRANSMISSOR</a:t>
             </a:r>
             <a:endParaRPr lang="pt-BR" sz="2500" dirty="0"/>
           </a:p>
@@ -5844,7 +6244,7 @@
       </p:sp>
       <p:pic>
         <p:nvPicPr>
-          <p:cNvPr id="10244" name="Picture 4"/>
+          <p:cNvPr id="1027" name="Picture 3"/>
           <p:cNvPicPr>
             <a:picLocks noChangeAspect="1" noChangeArrowheads="1"/>
           </p:cNvPicPr>
@@ -5859,8 +6259,8 @@
         </p:blipFill>
         <p:spPr bwMode="auto">
           <a:xfrm>
-            <a:off x="2928926" y="1785926"/>
-            <a:ext cx="3599763" cy="4786322"/>
+            <a:off x="1428728" y="2143116"/>
+            <a:ext cx="6362700" cy="4371975"/>
           </a:xfrm>
           <a:prstGeom prst="rect">
             <a:avLst/>
@@ -5925,7 +6325,11 @@
           <a:p>
             <a:r>
               <a:rPr lang="pt-BR" sz="2500" dirty="0" smtClean="0"/>
-              <a:t>FIRMWARE</a:t>
+              <a:t>FIRMWARE - </a:t>
+            </a:r>
+            <a:r>
+              <a:rPr lang="pt-BR" sz="2500" dirty="0" smtClean="0"/>
+              <a:t>TRANSMISSOR</a:t>
             </a:r>
             <a:endParaRPr lang="pt-BR" sz="2500" dirty="0"/>
           </a:p>
@@ -5933,7 +6337,7 @@
       </p:sp>
       <p:pic>
         <p:nvPicPr>
-          <p:cNvPr id="10242" name="Picture 2"/>
+          <p:cNvPr id="1026" name="Picture 2"/>
           <p:cNvPicPr>
             <a:picLocks noChangeAspect="1" noChangeArrowheads="1"/>
           </p:cNvPicPr>
@@ -5948,40 +6352,8 @@
         </p:blipFill>
         <p:spPr bwMode="auto">
           <a:xfrm>
-            <a:off x="628641" y="2857496"/>
-            <a:ext cx="4327186" cy="2990849"/>
-          </a:xfrm>
-          <a:prstGeom prst="rect">
-            <a:avLst/>
-          </a:prstGeom>
-          <a:noFill/>
-          <a:ln w="9525">
-            <a:noFill/>
-            <a:miter lim="800000"/>
-            <a:headEnd/>
-            <a:tailEnd/>
-          </a:ln>
-        </p:spPr>
-      </p:pic>
-      <p:pic>
-        <p:nvPicPr>
-          <p:cNvPr id="10243" name="Picture 3"/>
-          <p:cNvPicPr>
-            <a:picLocks noChangeAspect="1" noChangeArrowheads="1"/>
-          </p:cNvPicPr>
-          <p:nvPr/>
-        </p:nvPicPr>
-        <p:blipFill>
-          <a:blip r:embed="rId3" cstate="print"/>
-          <a:srcRect/>
-          <a:stretch>
-            <a:fillRect/>
-          </a:stretch>
-        </p:blipFill>
-        <p:spPr bwMode="auto">
-          <a:xfrm>
-            <a:off x="5557863" y="2857496"/>
-            <a:ext cx="2657475" cy="2952750"/>
+            <a:off x="39724" y="2428868"/>
+            <a:ext cx="9072594" cy="3673518"/>
           </a:xfrm>
           <a:prstGeom prst="rect">
             <a:avLst/>
@@ -6046,7 +6418,11 @@
           <a:p>
             <a:r>
               <a:rPr lang="pt-BR" sz="2500" dirty="0" smtClean="0"/>
-              <a:t>FIRMWARE</a:t>
+              <a:t>FIRMWARE - </a:t>
+            </a:r>
+            <a:r>
+              <a:rPr lang="pt-BR" sz="2500" dirty="0" smtClean="0"/>
+              <a:t>TRANSMISSOR</a:t>
             </a:r>
             <a:endParaRPr lang="pt-BR" sz="2500" dirty="0"/>
           </a:p>
@@ -6054,7 +6430,7 @@
       </p:sp>
       <p:pic>
         <p:nvPicPr>
-          <p:cNvPr id="11266" name="Picture 2"/>
+          <p:cNvPr id="10242" name="Picture 2"/>
           <p:cNvPicPr>
             <a:picLocks noChangeAspect="1" noChangeArrowheads="1"/>
           </p:cNvPicPr>
@@ -6069,8 +6445,8 @@
         </p:blipFill>
         <p:spPr bwMode="auto">
           <a:xfrm>
-            <a:off x="571472" y="3214686"/>
-            <a:ext cx="3543300" cy="2152650"/>
+            <a:off x="628641" y="2857496"/>
+            <a:ext cx="4327186" cy="2990849"/>
           </a:xfrm>
           <a:prstGeom prst="rect">
             <a:avLst/>
@@ -6086,7 +6462,7 @@
       </p:pic>
       <p:pic>
         <p:nvPicPr>
-          <p:cNvPr id="11267" name="Picture 3"/>
+          <p:cNvPr id="10243" name="Picture 3"/>
           <p:cNvPicPr>
             <a:picLocks noChangeAspect="1" noChangeArrowheads="1"/>
           </p:cNvPicPr>
@@ -6101,8 +6477,8 @@
         </p:blipFill>
         <p:spPr bwMode="auto">
           <a:xfrm>
-            <a:off x="4486303" y="3214686"/>
-            <a:ext cx="4086225" cy="2152650"/>
+            <a:off x="5557863" y="2857496"/>
+            <a:ext cx="2657475" cy="2952750"/>
           </a:xfrm>
           <a:prstGeom prst="rect">
             <a:avLst/>

</xml_diff>

<commit_message>
- Inseridos os slides sobre o acelerômetro e a solução RF. - Inseridas novas referências bibliográficas.
</commit_message>
<xml_diff>
--- a/documentos/apresentação.pptx
+++ b/documentos/apresentação.pptx
@@ -11,19 +11,24 @@
     <p:sldId id="267" r:id="rId5"/>
     <p:sldId id="268" r:id="rId6"/>
     <p:sldId id="269" r:id="rId7"/>
-    <p:sldId id="270" r:id="rId8"/>
-    <p:sldId id="275" r:id="rId9"/>
-    <p:sldId id="271" r:id="rId10"/>
-    <p:sldId id="272" r:id="rId11"/>
-    <p:sldId id="273" r:id="rId12"/>
-    <p:sldId id="276" r:id="rId13"/>
-    <p:sldId id="277" r:id="rId14"/>
-    <p:sldId id="278" r:id="rId15"/>
-    <p:sldId id="266" r:id="rId16"/>
-    <p:sldId id="262" r:id="rId17"/>
-    <p:sldId id="263" r:id="rId18"/>
-    <p:sldId id="264" r:id="rId19"/>
-    <p:sldId id="274" r:id="rId20"/>
+    <p:sldId id="280" r:id="rId8"/>
+    <p:sldId id="281" r:id="rId9"/>
+    <p:sldId id="282" r:id="rId10"/>
+    <p:sldId id="283" r:id="rId11"/>
+    <p:sldId id="270" r:id="rId12"/>
+    <p:sldId id="279" r:id="rId13"/>
+    <p:sldId id="275" r:id="rId14"/>
+    <p:sldId id="271" r:id="rId15"/>
+    <p:sldId id="272" r:id="rId16"/>
+    <p:sldId id="273" r:id="rId17"/>
+    <p:sldId id="276" r:id="rId18"/>
+    <p:sldId id="277" r:id="rId19"/>
+    <p:sldId id="278" r:id="rId20"/>
+    <p:sldId id="266" r:id="rId21"/>
+    <p:sldId id="262" r:id="rId22"/>
+    <p:sldId id="263" r:id="rId23"/>
+    <p:sldId id="264" r:id="rId24"/>
+    <p:sldId id="274" r:id="rId25"/>
   </p:sldIdLst>
   <p:sldSz cx="9144000" cy="6858000" type="screen4x3"/>
   <p:notesSz cx="6858000" cy="9144000"/>
@@ -4170,7 +4175,15 @@
           <a:p>
             <a:r>
               <a:rPr lang="pt-BR" dirty="0" smtClean="0"/>
-              <a:t>MSP430 RC Car</a:t>
+              <a:t>MSP430 </a:t>
+            </a:r>
+            <a:r>
+              <a:rPr lang="pt-BR" dirty="0" smtClean="0"/>
+              <a:t>– </a:t>
+            </a:r>
+            <a:r>
+              <a:rPr lang="pt-BR" dirty="0" smtClean="0"/>
+              <a:t>Controle Remoto</a:t>
             </a:r>
             <a:endParaRPr lang="pt-BR" dirty="0"/>
           </a:p>
@@ -4275,11 +4288,7 @@
           <a:p>
             <a:r>
               <a:rPr lang="pt-BR" sz="2500" dirty="0" smtClean="0"/>
-              <a:t>FIRMWARE - </a:t>
-            </a:r>
-            <a:r>
-              <a:rPr lang="pt-BR" sz="2500" dirty="0" smtClean="0"/>
-              <a:t>TRANSMISSOR</a:t>
+              <a:t>SOLUÇÃO RF (CHIPCON/TEXAS INSTRUMENTS)</a:t>
             </a:r>
             <a:endParaRPr lang="pt-BR" sz="2500" dirty="0"/>
           </a:p>
@@ -4287,7 +4296,7 @@
       </p:sp>
       <p:pic>
         <p:nvPicPr>
-          <p:cNvPr id="11266" name="Picture 2"/>
+          <p:cNvPr id="4098" name="Picture 2"/>
           <p:cNvPicPr>
             <a:picLocks noChangeAspect="1" noChangeArrowheads="1"/>
           </p:cNvPicPr>
@@ -4302,40 +4311,8 @@
         </p:blipFill>
         <p:spPr bwMode="auto">
           <a:xfrm>
-            <a:off x="571472" y="3214686"/>
-            <a:ext cx="3543300" cy="2152650"/>
-          </a:xfrm>
-          <a:prstGeom prst="rect">
-            <a:avLst/>
-          </a:prstGeom>
-          <a:noFill/>
-          <a:ln w="9525">
-            <a:noFill/>
-            <a:miter lim="800000"/>
-            <a:headEnd/>
-            <a:tailEnd/>
-          </a:ln>
-        </p:spPr>
-      </p:pic>
-      <p:pic>
-        <p:nvPicPr>
-          <p:cNvPr id="11267" name="Picture 3"/>
-          <p:cNvPicPr>
-            <a:picLocks noChangeAspect="1" noChangeArrowheads="1"/>
-          </p:cNvPicPr>
-          <p:nvPr/>
-        </p:nvPicPr>
-        <p:blipFill>
-          <a:blip r:embed="rId3" cstate="print"/>
-          <a:srcRect/>
-          <a:stretch>
-            <a:fillRect/>
-          </a:stretch>
-        </p:blipFill>
-        <p:spPr bwMode="auto">
-          <a:xfrm>
-            <a:off x="4486303" y="3214686"/>
-            <a:ext cx="4086225" cy="2152650"/>
+            <a:off x="2071670" y="2558756"/>
+            <a:ext cx="5000660" cy="3013384"/>
           </a:xfrm>
           <a:prstGeom prst="rect">
             <a:avLst/>
@@ -4400,11 +4377,7 @@
           <a:p>
             <a:r>
               <a:rPr lang="pt-BR" sz="2500" dirty="0" smtClean="0"/>
-              <a:t>FIRMWARE - </a:t>
-            </a:r>
-            <a:r>
-              <a:rPr lang="pt-BR" sz="2500" dirty="0" smtClean="0"/>
-              <a:t>TRANSMISSOR</a:t>
+              <a:t>SOLUÇÃO RF (CHIPCON/TEXAS INSTRUMENTS)</a:t>
             </a:r>
             <a:endParaRPr lang="pt-BR" sz="2500" dirty="0"/>
           </a:p>
@@ -4412,7 +4385,7 @@
       </p:sp>
       <p:pic>
         <p:nvPicPr>
-          <p:cNvPr id="12290" name="Picture 2"/>
+          <p:cNvPr id="4099" name="Picture 3"/>
           <p:cNvPicPr>
             <a:picLocks noChangeAspect="1" noChangeArrowheads="1"/>
           </p:cNvPicPr>
@@ -4427,8 +4400,8 @@
         </p:blipFill>
         <p:spPr bwMode="auto">
           <a:xfrm>
-            <a:off x="2571736" y="2285992"/>
-            <a:ext cx="3800475" cy="1666875"/>
+            <a:off x="2214546" y="2071678"/>
+            <a:ext cx="4286280" cy="2168578"/>
           </a:xfrm>
           <a:prstGeom prst="rect">
             <a:avLst/>
@@ -4444,7 +4417,7 @@
       </p:pic>
       <p:pic>
         <p:nvPicPr>
-          <p:cNvPr id="12291" name="Picture 3"/>
+          <p:cNvPr id="4100" name="Picture 4"/>
           <p:cNvPicPr>
             <a:picLocks noChangeAspect="1" noChangeArrowheads="1"/>
           </p:cNvPicPr>
@@ -4459,8 +4432,40 @@
         </p:blipFill>
         <p:spPr bwMode="auto">
           <a:xfrm>
-            <a:off x="1571604" y="4429132"/>
-            <a:ext cx="5734050" cy="1981200"/>
+            <a:off x="1500166" y="4331216"/>
+            <a:ext cx="6143668" cy="597982"/>
+          </a:xfrm>
+          <a:prstGeom prst="rect">
+            <a:avLst/>
+          </a:prstGeom>
+          <a:noFill/>
+          <a:ln w="9525">
+            <a:noFill/>
+            <a:miter lim="800000"/>
+            <a:headEnd/>
+            <a:tailEnd/>
+          </a:ln>
+        </p:spPr>
+      </p:pic>
+      <p:pic>
+        <p:nvPicPr>
+          <p:cNvPr id="4101" name="Picture 5"/>
+          <p:cNvPicPr>
+            <a:picLocks noChangeAspect="1" noChangeArrowheads="1"/>
+          </p:cNvPicPr>
+          <p:nvPr/>
+        </p:nvPicPr>
+        <p:blipFill>
+          <a:blip r:embed="rId4" cstate="print"/>
+          <a:srcRect/>
+          <a:stretch>
+            <a:fillRect/>
+          </a:stretch>
+        </p:blipFill>
+        <p:spPr bwMode="auto">
+          <a:xfrm>
+            <a:off x="1500167" y="5066491"/>
+            <a:ext cx="6143668" cy="1525664"/>
           </a:xfrm>
           <a:prstGeom prst="rect">
             <a:avLst/>
@@ -4525,11 +4530,7 @@
           <a:p>
             <a:r>
               <a:rPr lang="pt-BR" sz="2500" dirty="0" smtClean="0"/>
-              <a:t>FIRMWARE - </a:t>
-            </a:r>
-            <a:r>
-              <a:rPr lang="pt-BR" sz="2500" dirty="0" smtClean="0"/>
-              <a:t>TRANSMISSOR</a:t>
+              <a:t>FIRMWARE - TRANSMISSOR</a:t>
             </a:r>
             <a:endParaRPr lang="pt-BR" sz="2500" dirty="0"/>
           </a:p>
@@ -4537,7 +4538,7 @@
       </p:sp>
       <p:pic>
         <p:nvPicPr>
-          <p:cNvPr id="2050" name="Picture 2"/>
+          <p:cNvPr id="1027" name="Picture 3"/>
           <p:cNvPicPr>
             <a:picLocks noChangeAspect="1" noChangeArrowheads="1"/>
           </p:cNvPicPr>
@@ -4552,8 +4553,8 @@
         </p:blipFill>
         <p:spPr bwMode="auto">
           <a:xfrm>
-            <a:off x="2724150" y="2562243"/>
-            <a:ext cx="3695700" cy="3438525"/>
+            <a:off x="1428728" y="2143116"/>
+            <a:ext cx="6362700" cy="4371975"/>
           </a:xfrm>
           <a:prstGeom prst="rect">
             <a:avLst/>
@@ -4618,7 +4619,7 @@
           <a:p>
             <a:r>
               <a:rPr lang="pt-BR" sz="2500" dirty="0" smtClean="0"/>
-              <a:t>FIRMWARE - RECEPTOR </a:t>
+              <a:t>FIRMWARE - TRANSMISSOR</a:t>
             </a:r>
             <a:endParaRPr lang="pt-BR" sz="2500" dirty="0"/>
           </a:p>
@@ -4626,7 +4627,7 @@
       </p:sp>
       <p:pic>
         <p:nvPicPr>
-          <p:cNvPr id="3074" name="Picture 2"/>
+          <p:cNvPr id="1026" name="Picture 2"/>
           <p:cNvPicPr>
             <a:picLocks noChangeAspect="1" noChangeArrowheads="1"/>
           </p:cNvPicPr>
@@ -4641,8 +4642,8 @@
         </p:blipFill>
         <p:spPr bwMode="auto">
           <a:xfrm>
-            <a:off x="2528888" y="2214554"/>
-            <a:ext cx="4086225" cy="4048125"/>
+            <a:off x="39724" y="2428868"/>
+            <a:ext cx="9072594" cy="3673518"/>
           </a:xfrm>
           <a:prstGeom prst="rect">
             <a:avLst/>
@@ -4707,7 +4708,7 @@
           <a:p>
             <a:r>
               <a:rPr lang="pt-BR" sz="2500" dirty="0" smtClean="0"/>
-              <a:t>FIRMWARE - RECEPTOR </a:t>
+              <a:t>FIRMWARE - TRANSMISSOR</a:t>
             </a:r>
             <a:endParaRPr lang="pt-BR" sz="2500" dirty="0"/>
           </a:p>
@@ -4715,7 +4716,7 @@
       </p:sp>
       <p:pic>
         <p:nvPicPr>
-          <p:cNvPr id="4098" name="Picture 2"/>
+          <p:cNvPr id="10242" name="Picture 2"/>
           <p:cNvPicPr>
             <a:picLocks noChangeAspect="1" noChangeArrowheads="1"/>
           </p:cNvPicPr>
@@ -4730,8 +4731,40 @@
         </p:blipFill>
         <p:spPr bwMode="auto">
           <a:xfrm>
-            <a:off x="1152525" y="2090759"/>
-            <a:ext cx="6838950" cy="4410075"/>
+            <a:off x="628641" y="2857496"/>
+            <a:ext cx="4327186" cy="2990849"/>
+          </a:xfrm>
+          <a:prstGeom prst="rect">
+            <a:avLst/>
+          </a:prstGeom>
+          <a:noFill/>
+          <a:ln w="9525">
+            <a:noFill/>
+            <a:miter lim="800000"/>
+            <a:headEnd/>
+            <a:tailEnd/>
+          </a:ln>
+        </p:spPr>
+      </p:pic>
+      <p:pic>
+        <p:nvPicPr>
+          <p:cNvPr id="10243" name="Picture 3"/>
+          <p:cNvPicPr>
+            <a:picLocks noChangeAspect="1" noChangeArrowheads="1"/>
+          </p:cNvPicPr>
+          <p:nvPr/>
+        </p:nvPicPr>
+        <p:blipFill>
+          <a:blip r:embed="rId3" cstate="print"/>
+          <a:srcRect/>
+          <a:stretch>
+            <a:fillRect/>
+          </a:stretch>
+        </p:blipFill>
+        <p:spPr bwMode="auto">
+          <a:xfrm>
+            <a:off x="5557863" y="2857496"/>
+            <a:ext cx="2657475" cy="2952750"/>
           </a:xfrm>
           <a:prstGeom prst="rect">
             <a:avLst/>
@@ -4796,51 +4829,19 @@
           <a:p>
             <a:r>
               <a:rPr lang="pt-BR" sz="2500" dirty="0" smtClean="0"/>
-              <a:t>REPOSITÓRIO E CONTROLE DE VERSÃO</a:t>
+              <a:t>FIRMWARE - TRANSMISSOR</a:t>
             </a:r>
             <a:endParaRPr lang="pt-BR" sz="2500" dirty="0"/>
-          </a:p>
-        </p:txBody>
-      </p:sp>
-      <p:sp>
-        <p:nvSpPr>
-          <p:cNvPr id="5" name="Retângulo 4"/>
-          <p:cNvSpPr/>
-          <p:nvPr/>
-        </p:nvSpPr>
-        <p:spPr>
-          <a:xfrm>
-            <a:off x="1428760" y="2059536"/>
-            <a:ext cx="6072198" cy="338554"/>
-          </a:xfrm>
-          <a:prstGeom prst="rect">
-            <a:avLst/>
-          </a:prstGeom>
-        </p:spPr>
-        <p:txBody>
-          <a:bodyPr wrap="square">
-            <a:spAutoFit/>
-          </a:bodyPr>
-          <a:lstStyle/>
-          <a:p>
-            <a:pPr algn="ctr"/>
-            <a:r>
-              <a:rPr lang="pt-BR" sz="1600" u="sng" dirty="0" smtClean="0"/>
-              <a:t>http://code.google.com/p/msp430-remote-control-car/</a:t>
-            </a:r>
-            <a:endParaRPr lang="pt-BR" sz="1600" u="sng" dirty="0"/>
           </a:p>
         </p:txBody>
       </p:sp>
       <p:pic>
         <p:nvPicPr>
-          <p:cNvPr id="1027" name="Picture 3"/>
+          <p:cNvPr id="11266" name="Picture 2"/>
           <p:cNvPicPr>
-            <a:picLocks noGrp="1" noChangeAspect="1" noChangeArrowheads="1"/>
+            <a:picLocks noChangeAspect="1" noChangeArrowheads="1"/>
           </p:cNvPicPr>
-          <p:nvPr>
-            <p:ph idx="1"/>
-          </p:nvPr>
+          <p:nvPr/>
         </p:nvPicPr>
         <p:blipFill>
           <a:blip r:embed="rId2" cstate="print"/>
@@ -4851,8 +4852,40 @@
         </p:blipFill>
         <p:spPr bwMode="auto">
           <a:xfrm>
-            <a:off x="1357313" y="2506581"/>
-            <a:ext cx="6429375" cy="4175289"/>
+            <a:off x="571472" y="3214686"/>
+            <a:ext cx="3543300" cy="2152650"/>
+          </a:xfrm>
+          <a:prstGeom prst="rect">
+            <a:avLst/>
+          </a:prstGeom>
+          <a:noFill/>
+          <a:ln w="9525">
+            <a:noFill/>
+            <a:miter lim="800000"/>
+            <a:headEnd/>
+            <a:tailEnd/>
+          </a:ln>
+        </p:spPr>
+      </p:pic>
+      <p:pic>
+        <p:nvPicPr>
+          <p:cNvPr id="11267" name="Picture 3"/>
+          <p:cNvPicPr>
+            <a:picLocks noChangeAspect="1" noChangeArrowheads="1"/>
+          </p:cNvPicPr>
+          <p:nvPr/>
+        </p:nvPicPr>
+        <p:blipFill>
+          <a:blip r:embed="rId3" cstate="print"/>
+          <a:srcRect/>
+          <a:stretch>
+            <a:fillRect/>
+          </a:stretch>
+        </p:blipFill>
+        <p:spPr bwMode="auto">
+          <a:xfrm>
+            <a:off x="4486303" y="3214686"/>
+            <a:ext cx="4086225" cy="2152650"/>
           </a:xfrm>
           <a:prstGeom prst="rect">
             <a:avLst/>
@@ -4917,7 +4950,7 @@
           <a:p>
             <a:r>
               <a:rPr lang="pt-BR" sz="2500" dirty="0" smtClean="0"/>
-              <a:t>REPOSITÓRIO E CONTROLE DE VERSÃO</a:t>
+              <a:t>FIRMWARE - TRANSMISSOR</a:t>
             </a:r>
             <a:endParaRPr lang="pt-BR" sz="2500" dirty="0"/>
           </a:p>
@@ -4925,13 +4958,11 @@
       </p:sp>
       <p:pic>
         <p:nvPicPr>
-          <p:cNvPr id="3074" name="Picture 2"/>
+          <p:cNvPr id="12290" name="Picture 2"/>
           <p:cNvPicPr>
-            <a:picLocks noGrp="1" noChangeAspect="1" noChangeArrowheads="1"/>
+            <a:picLocks noChangeAspect="1" noChangeArrowheads="1"/>
           </p:cNvPicPr>
-          <p:nvPr>
-            <p:ph idx="1"/>
-          </p:nvPr>
+          <p:nvPr/>
         </p:nvPicPr>
         <p:blipFill>
           <a:blip r:embed="rId2" cstate="print"/>
@@ -4942,8 +4973,40 @@
         </p:blipFill>
         <p:spPr bwMode="auto">
           <a:xfrm>
-            <a:off x="1532871" y="2071678"/>
-            <a:ext cx="6110963" cy="4500594"/>
+            <a:off x="2571736" y="2285992"/>
+            <a:ext cx="3800475" cy="1666875"/>
+          </a:xfrm>
+          <a:prstGeom prst="rect">
+            <a:avLst/>
+          </a:prstGeom>
+          <a:noFill/>
+          <a:ln w="9525">
+            <a:noFill/>
+            <a:miter lim="800000"/>
+            <a:headEnd/>
+            <a:tailEnd/>
+          </a:ln>
+        </p:spPr>
+      </p:pic>
+      <p:pic>
+        <p:nvPicPr>
+          <p:cNvPr id="12291" name="Picture 3"/>
+          <p:cNvPicPr>
+            <a:picLocks noChangeAspect="1" noChangeArrowheads="1"/>
+          </p:cNvPicPr>
+          <p:nvPr/>
+        </p:nvPicPr>
+        <p:blipFill>
+          <a:blip r:embed="rId3" cstate="print"/>
+          <a:srcRect/>
+          <a:stretch>
+            <a:fillRect/>
+          </a:stretch>
+        </p:blipFill>
+        <p:spPr bwMode="auto">
+          <a:xfrm>
+            <a:off x="1571604" y="4429132"/>
+            <a:ext cx="5734050" cy="1981200"/>
           </a:xfrm>
           <a:prstGeom prst="rect">
             <a:avLst/>
@@ -5008,7 +5071,7 @@
           <a:p>
             <a:r>
               <a:rPr lang="pt-BR" sz="2500" dirty="0" smtClean="0"/>
-              <a:t>REPOSITÓRIO E CONTROLE DE VERSÃO</a:t>
+              <a:t>FIRMWARE - TRANSMISSOR</a:t>
             </a:r>
             <a:endParaRPr lang="pt-BR" sz="2500" dirty="0"/>
           </a:p>
@@ -5016,13 +5079,11 @@
       </p:sp>
       <p:pic>
         <p:nvPicPr>
-          <p:cNvPr id="2051" name="Picture 3"/>
+          <p:cNvPr id="2050" name="Picture 2"/>
           <p:cNvPicPr>
-            <a:picLocks noGrp="1" noChangeAspect="1" noChangeArrowheads="1"/>
+            <a:picLocks noChangeAspect="1" noChangeArrowheads="1"/>
           </p:cNvPicPr>
-          <p:nvPr>
-            <p:ph idx="1"/>
-          </p:nvPr>
+          <p:nvPr/>
         </p:nvPicPr>
         <p:blipFill>
           <a:blip r:embed="rId2" cstate="print"/>
@@ -5033,40 +5094,8 @@
         </p:blipFill>
         <p:spPr bwMode="auto">
           <a:xfrm>
-            <a:off x="1285852" y="2786058"/>
-            <a:ext cx="6572296" cy="3856918"/>
-          </a:xfrm>
-          <a:prstGeom prst="rect">
-            <a:avLst/>
-          </a:prstGeom>
-          <a:noFill/>
-          <a:ln w="9525">
-            <a:noFill/>
-            <a:miter lim="800000"/>
-            <a:headEnd/>
-            <a:tailEnd/>
-          </a:ln>
-        </p:spPr>
-      </p:pic>
-      <p:pic>
-        <p:nvPicPr>
-          <p:cNvPr id="4099" name="Picture 3"/>
-          <p:cNvPicPr>
-            <a:picLocks noChangeAspect="1" noChangeArrowheads="1"/>
-          </p:cNvPicPr>
-          <p:nvPr/>
-        </p:nvPicPr>
-        <p:blipFill>
-          <a:blip r:embed="rId3" cstate="print"/>
-          <a:srcRect/>
-          <a:stretch>
-            <a:fillRect/>
-          </a:stretch>
-        </p:blipFill>
-        <p:spPr bwMode="auto">
-          <a:xfrm>
-            <a:off x="3000364" y="2030362"/>
-            <a:ext cx="3367095" cy="684258"/>
+            <a:off x="2724150" y="2562243"/>
+            <a:ext cx="3695700" cy="3438525"/>
           </a:xfrm>
           <a:prstGeom prst="rect">
             <a:avLst/>
@@ -5131,79 +5160,44 @@
           <a:p>
             <a:r>
               <a:rPr lang="pt-BR" sz="2500" dirty="0" smtClean="0"/>
-              <a:t>DIFICULDADES</a:t>
+              <a:t>FIRMWARE - RECEPTOR </a:t>
             </a:r>
             <a:endParaRPr lang="pt-BR" sz="2500" dirty="0"/>
           </a:p>
         </p:txBody>
       </p:sp>
-      <p:sp>
-        <p:nvSpPr>
-          <p:cNvPr id="5" name="Espaço Reservado para Conteúdo 4"/>
-          <p:cNvSpPr>
-            <a:spLocks noGrp="1"/>
-          </p:cNvSpPr>
-          <p:nvPr>
-            <p:ph idx="1"/>
-          </p:nvPr>
-        </p:nvSpPr>
-        <p:spPr/>
-        <p:txBody>
-          <a:bodyPr>
-            <a:normAutofit lnSpcReduction="10000"/>
-          </a:bodyPr>
-          <a:lstStyle/>
-          <a:p>
-            <a:r>
-              <a:rPr lang="pt-BR" sz="2200" dirty="0" smtClean="0"/>
-              <a:t>Compra de componentes.</a:t>
-            </a:r>
-          </a:p>
-          <a:p>
-            <a:r>
-              <a:rPr lang="pt-BR" sz="2200" dirty="0" smtClean="0"/>
-              <a:t>Soldagem do acelerômetro.</a:t>
-            </a:r>
-          </a:p>
-          <a:p>
-            <a:r>
-              <a:rPr lang="pt-BR" sz="2200" dirty="0" smtClean="0"/>
-              <a:t>Reuso da biblioteca RF da Texas Instruments.</a:t>
-            </a:r>
-          </a:p>
-          <a:p>
-            <a:r>
-              <a:rPr lang="pt-BR" sz="2200" dirty="0" smtClean="0"/>
-              <a:t>Desenvolver um código onde funcionam simultaneamente o RF e o acelerômetro.</a:t>
-            </a:r>
-          </a:p>
-          <a:p>
-            <a:r>
-              <a:rPr lang="pt-BR" sz="2200" dirty="0" smtClean="0"/>
-              <a:t>Falha nas pilhas do kit de desenvolvimento eZ430-RF2500.</a:t>
-            </a:r>
-          </a:p>
-          <a:p>
-            <a:r>
-              <a:rPr lang="pt-BR" sz="2200" dirty="0" smtClean="0"/>
-              <a:t>A documentação do acelerômetro demonstrou uma leitura difícil e com poucas explicações em algumas seções.</a:t>
-            </a:r>
-          </a:p>
-          <a:p>
-            <a:r>
-              <a:rPr lang="pt-BR" sz="2200" dirty="0" smtClean="0"/>
-              <a:t>A documentação do MSP430 não tem informações suficientes sobre o funcionamento da interface SPI a 3 fios.</a:t>
-            </a:r>
-          </a:p>
-          <a:p>
-            <a:r>
-              <a:rPr lang="pt-BR" sz="2200" dirty="0" smtClean="0"/>
-              <a:t>A documentação do acelerômetro contém um algoritmo de leitura/escrita que mostrou não ser adequado para funcionar no modo SPI a 3 fios.</a:t>
-            </a:r>
-            <a:endParaRPr lang="pt-BR" sz="2200" dirty="0"/>
-          </a:p>
-        </p:txBody>
-      </p:sp>
+      <p:pic>
+        <p:nvPicPr>
+          <p:cNvPr id="3074" name="Picture 2"/>
+          <p:cNvPicPr>
+            <a:picLocks noChangeAspect="1" noChangeArrowheads="1"/>
+          </p:cNvPicPr>
+          <p:nvPr/>
+        </p:nvPicPr>
+        <p:blipFill>
+          <a:blip r:embed="rId2" cstate="print"/>
+          <a:srcRect/>
+          <a:stretch>
+            <a:fillRect/>
+          </a:stretch>
+        </p:blipFill>
+        <p:spPr bwMode="auto">
+          <a:xfrm>
+            <a:off x="2528888" y="2214554"/>
+            <a:ext cx="4086225" cy="4048125"/>
+          </a:xfrm>
+          <a:prstGeom prst="rect">
+            <a:avLst/>
+          </a:prstGeom>
+          <a:noFill/>
+          <a:ln w="9525">
+            <a:noFill/>
+            <a:miter lim="800000"/>
+            <a:headEnd/>
+            <a:tailEnd/>
+          </a:ln>
+        </p:spPr>
+      </p:pic>
     </p:spTree>
   </p:cSld>
   <p:clrMapOvr>
@@ -5254,195 +5248,45 @@
           <a:lstStyle/>
           <a:p>
             <a:r>
-              <a:rPr lang="en-US" sz="2500" dirty="0" smtClean="0"/>
-              <a:t>REFERÊNCIAS BIBLIOGRÁFICAS</a:t>
+              <a:rPr lang="pt-BR" sz="2500" dirty="0" smtClean="0"/>
+              <a:t>FIRMWARE - RECEPTOR </a:t>
             </a:r>
             <a:endParaRPr lang="pt-BR" sz="2500" dirty="0"/>
           </a:p>
         </p:txBody>
       </p:sp>
-      <p:sp>
-        <p:nvSpPr>
-          <p:cNvPr id="5" name="Espaço Reservado para Conteúdo 4"/>
-          <p:cNvSpPr>
-            <a:spLocks noGrp="1"/>
-          </p:cNvSpPr>
-          <p:nvPr>
-            <p:ph idx="1"/>
-          </p:nvPr>
-        </p:nvSpPr>
-        <p:spPr/>
-        <p:txBody>
-          <a:bodyPr>
-            <a:noAutofit/>
-          </a:bodyPr>
-          <a:lstStyle/>
-          <a:p>
-            <a:r>
-              <a:rPr lang="pt-BR" sz="1800" i="1" dirty="0" smtClean="0"/>
-              <a:t>MSP430 </a:t>
-            </a:r>
-            <a:r>
-              <a:rPr lang="pt-BR" sz="1800" i="1" dirty="0" err="1" smtClean="0"/>
-              <a:t>Microcontroller</a:t>
-            </a:r>
-            <a:r>
-              <a:rPr lang="pt-BR" sz="1800" i="1" dirty="0" smtClean="0"/>
-              <a:t> </a:t>
-            </a:r>
-            <a:r>
-              <a:rPr lang="pt-BR" sz="1800" i="1" dirty="0" err="1" smtClean="0"/>
-              <a:t>Basics</a:t>
-            </a:r>
-            <a:r>
-              <a:rPr lang="pt-BR" sz="1800" dirty="0" smtClean="0"/>
-              <a:t>, John </a:t>
-            </a:r>
-            <a:r>
-              <a:rPr lang="pt-BR" sz="1800" dirty="0" err="1" smtClean="0"/>
-              <a:t>Davies</a:t>
-            </a:r>
-            <a:r>
-              <a:rPr lang="pt-BR" sz="1800" dirty="0" smtClean="0"/>
-              <a:t>, 2008</a:t>
-            </a:r>
-          </a:p>
-          <a:p>
-            <a:r>
-              <a:rPr lang="pt-BR" sz="1800" i="1" dirty="0" smtClean="0"/>
-              <a:t>MMA7455L Datasheet</a:t>
-            </a:r>
-            <a:r>
-              <a:rPr lang="pt-BR" sz="1800" dirty="0" smtClean="0"/>
-              <a:t>, Freescale </a:t>
-            </a:r>
-            <a:r>
-              <a:rPr lang="pt-BR" sz="1800" dirty="0" err="1" smtClean="0"/>
-              <a:t>Semiconductor</a:t>
-            </a:r>
-            <a:r>
-              <a:rPr lang="pt-BR" sz="1800" dirty="0" smtClean="0"/>
-              <a:t>, 2009</a:t>
-            </a:r>
-          </a:p>
-          <a:p>
-            <a:r>
-              <a:rPr lang="pt-BR" sz="1800" i="1" dirty="0" err="1" smtClean="0"/>
-              <a:t>The</a:t>
-            </a:r>
-            <a:r>
-              <a:rPr lang="pt-BR" sz="1800" i="1" dirty="0" smtClean="0"/>
-              <a:t> MMA745xL Digital </a:t>
-            </a:r>
-            <a:r>
-              <a:rPr lang="pt-BR" sz="1800" i="1" dirty="0" err="1" smtClean="0"/>
-              <a:t>Accelerometer</a:t>
-            </a:r>
-            <a:r>
-              <a:rPr lang="pt-BR" sz="1800" i="1" dirty="0" smtClean="0"/>
-              <a:t> (AN3468)</a:t>
-            </a:r>
-            <a:r>
-              <a:rPr lang="pt-BR" sz="1800" dirty="0" smtClean="0"/>
-              <a:t>, Freescale </a:t>
-            </a:r>
-            <a:r>
-              <a:rPr lang="pt-BR" sz="1800" dirty="0" err="1" smtClean="0"/>
-              <a:t>Semiconductor</a:t>
-            </a:r>
-            <a:r>
-              <a:rPr lang="pt-BR" sz="1800" dirty="0" smtClean="0"/>
-              <a:t>, 2009</a:t>
-            </a:r>
-          </a:p>
-          <a:p>
-            <a:r>
-              <a:rPr lang="en-US" sz="1800" i="1" dirty="0" smtClean="0"/>
-              <a:t>CC2500 Datasheet</a:t>
-            </a:r>
-            <a:r>
-              <a:rPr lang="en-US" sz="1800" dirty="0" smtClean="0"/>
-              <a:t>, </a:t>
-            </a:r>
-            <a:r>
-              <a:rPr lang="en-US" sz="1800" dirty="0" err="1" smtClean="0"/>
-              <a:t>Chipcon</a:t>
-            </a:r>
-            <a:r>
-              <a:rPr lang="en-US" sz="1800" dirty="0" smtClean="0"/>
-              <a:t>, 2006</a:t>
-            </a:r>
-          </a:p>
-          <a:p>
-            <a:r>
-              <a:rPr lang="pt-BR" sz="1800" i="1" dirty="0" smtClean="0"/>
-              <a:t>eZ430-RF2500 </a:t>
-            </a:r>
-            <a:r>
-              <a:rPr lang="pt-BR" sz="1800" i="1" dirty="0" err="1" smtClean="0"/>
-              <a:t>Development</a:t>
-            </a:r>
-            <a:r>
-              <a:rPr lang="pt-BR" sz="1800" i="1" dirty="0" smtClean="0"/>
-              <a:t> </a:t>
-            </a:r>
-            <a:r>
-              <a:rPr lang="pt-BR" sz="1800" i="1" dirty="0" err="1" smtClean="0"/>
-              <a:t>Tool</a:t>
-            </a:r>
-            <a:r>
-              <a:rPr lang="pt-BR" sz="1800" i="1" dirty="0" smtClean="0"/>
-              <a:t> – </a:t>
-            </a:r>
-            <a:r>
-              <a:rPr lang="pt-BR" sz="1800" i="1" dirty="0" err="1" smtClean="0"/>
-              <a:t>User’s</a:t>
-            </a:r>
-            <a:r>
-              <a:rPr lang="pt-BR" sz="1800" i="1" dirty="0" smtClean="0"/>
-              <a:t> </a:t>
-            </a:r>
-            <a:r>
-              <a:rPr lang="pt-BR" sz="1800" i="1" dirty="0" err="1" smtClean="0"/>
-              <a:t>Guide</a:t>
-            </a:r>
-            <a:r>
-              <a:rPr lang="pt-BR" sz="1800" dirty="0" smtClean="0"/>
-              <a:t>, Texas Instruments, 2009</a:t>
-            </a:r>
-          </a:p>
-          <a:p>
-            <a:r>
-              <a:rPr lang="pt-BR" sz="1800" i="1" dirty="0" smtClean="0"/>
-              <a:t>MSP430x2xx </a:t>
-            </a:r>
-            <a:r>
-              <a:rPr lang="pt-BR" sz="1800" i="1" dirty="0" err="1" smtClean="0"/>
-              <a:t>Family</a:t>
-            </a:r>
-            <a:r>
-              <a:rPr lang="pt-BR" sz="1800" i="1" dirty="0" smtClean="0"/>
-              <a:t> – </a:t>
-            </a:r>
-            <a:r>
-              <a:rPr lang="pt-BR" sz="1800" i="1" dirty="0" err="1" smtClean="0"/>
-              <a:t>User's</a:t>
-            </a:r>
-            <a:r>
-              <a:rPr lang="pt-BR" sz="1800" i="1" dirty="0" smtClean="0"/>
-              <a:t> </a:t>
-            </a:r>
-            <a:r>
-              <a:rPr lang="pt-BR" sz="1800" i="1" dirty="0" err="1" smtClean="0"/>
-              <a:t>Guide</a:t>
-            </a:r>
-            <a:r>
-              <a:rPr lang="pt-BR" sz="1800" dirty="0" smtClean="0"/>
-              <a:t>, Texas Instruments, 2009</a:t>
-            </a:r>
-          </a:p>
-        </p:txBody>
-      </p:sp>
+      <p:pic>
+        <p:nvPicPr>
+          <p:cNvPr id="4098" name="Picture 2"/>
+          <p:cNvPicPr>
+            <a:picLocks noChangeAspect="1" noChangeArrowheads="1"/>
+          </p:cNvPicPr>
+          <p:nvPr/>
+        </p:nvPicPr>
+        <p:blipFill>
+          <a:blip r:embed="rId2" cstate="print"/>
+          <a:srcRect/>
+          <a:stretch>
+            <a:fillRect/>
+          </a:stretch>
+        </p:blipFill>
+        <p:spPr bwMode="auto">
+          <a:xfrm>
+            <a:off x="1152525" y="2090759"/>
+            <a:ext cx="6838950" cy="4410075"/>
+          </a:xfrm>
+          <a:prstGeom prst="rect">
+            <a:avLst/>
+          </a:prstGeom>
+          <a:noFill/>
+          <a:ln w="9525">
+            <a:noFill/>
+            <a:miter lim="800000"/>
+            <a:headEnd/>
+            <a:tailEnd/>
+          </a:ln>
+        </p:spPr>
+      </p:pic>
     </p:spTree>
   </p:cSld>
   <p:clrMapOvr>
@@ -5553,6 +5397,731 @@
           <a:p>
             <a:pPr lvl="1"/>
             <a:endParaRPr lang="pt-BR" dirty="0" smtClean="0"/>
+          </a:p>
+        </p:txBody>
+      </p:sp>
+    </p:spTree>
+  </p:cSld>
+  <p:clrMapOvr>
+    <a:masterClrMapping/>
+  </p:clrMapOvr>
+  <p:timing>
+    <p:tnLst>
+      <p:par>
+        <p:cTn id="1" dur="indefinite" restart="never" nodeType="tmRoot"/>
+      </p:par>
+    </p:tnLst>
+  </p:timing>
+</p:sld>
+</file>
+
+<file path=ppt/slides/slide20.xml><?xml version="1.0" encoding="utf-8"?>
+<p:sld xmlns:a="http://schemas.openxmlformats.org/drawingml/2006/main" xmlns:r="http://schemas.openxmlformats.org/officeDocument/2006/relationships" xmlns:p="http://schemas.openxmlformats.org/presentationml/2006/main">
+  <p:cSld>
+    <p:spTree>
+      <p:nvGrpSpPr>
+        <p:cNvPr id="1" name=""/>
+        <p:cNvGrpSpPr/>
+        <p:nvPr/>
+      </p:nvGrpSpPr>
+      <p:grpSpPr>
+        <a:xfrm>
+          <a:off x="0" y="0"/>
+          <a:ext cx="0" cy="0"/>
+          <a:chOff x="0" y="0"/>
+          <a:chExt cx="0" cy="0"/>
+        </a:xfrm>
+      </p:grpSpPr>
+      <p:sp>
+        <p:nvSpPr>
+          <p:cNvPr id="2" name="Título 1"/>
+          <p:cNvSpPr>
+            <a:spLocks noGrp="1"/>
+          </p:cNvSpPr>
+          <p:nvPr>
+            <p:ph type="title"/>
+          </p:nvPr>
+        </p:nvSpPr>
+        <p:spPr/>
+        <p:txBody>
+          <a:bodyPr>
+            <a:normAutofit/>
+          </a:bodyPr>
+          <a:lstStyle/>
+          <a:p>
+            <a:r>
+              <a:rPr lang="pt-BR" sz="2500" dirty="0" smtClean="0"/>
+              <a:t>REPOSITÓRIO E CONTROLE DE VERSÃO</a:t>
+            </a:r>
+            <a:endParaRPr lang="pt-BR" sz="2500" dirty="0"/>
+          </a:p>
+        </p:txBody>
+      </p:sp>
+      <p:sp>
+        <p:nvSpPr>
+          <p:cNvPr id="5" name="Retângulo 4"/>
+          <p:cNvSpPr/>
+          <p:nvPr/>
+        </p:nvSpPr>
+        <p:spPr>
+          <a:xfrm>
+            <a:off x="1428760" y="2059536"/>
+            <a:ext cx="6072198" cy="338554"/>
+          </a:xfrm>
+          <a:prstGeom prst="rect">
+            <a:avLst/>
+          </a:prstGeom>
+        </p:spPr>
+        <p:txBody>
+          <a:bodyPr wrap="square">
+            <a:spAutoFit/>
+          </a:bodyPr>
+          <a:lstStyle/>
+          <a:p>
+            <a:pPr algn="ctr"/>
+            <a:r>
+              <a:rPr lang="pt-BR" sz="1600" u="sng" dirty="0" smtClean="0"/>
+              <a:t>http://code.google.com/p/msp430-remote-control-car/</a:t>
+            </a:r>
+            <a:endParaRPr lang="pt-BR" sz="1600" u="sng" dirty="0"/>
+          </a:p>
+        </p:txBody>
+      </p:sp>
+      <p:pic>
+        <p:nvPicPr>
+          <p:cNvPr id="1027" name="Picture 3"/>
+          <p:cNvPicPr>
+            <a:picLocks noGrp="1" noChangeAspect="1" noChangeArrowheads="1"/>
+          </p:cNvPicPr>
+          <p:nvPr>
+            <p:ph idx="1"/>
+          </p:nvPr>
+        </p:nvPicPr>
+        <p:blipFill>
+          <a:blip r:embed="rId2" cstate="print"/>
+          <a:srcRect/>
+          <a:stretch>
+            <a:fillRect/>
+          </a:stretch>
+        </p:blipFill>
+        <p:spPr bwMode="auto">
+          <a:xfrm>
+            <a:off x="1357313" y="2506581"/>
+            <a:ext cx="6429375" cy="4175289"/>
+          </a:xfrm>
+          <a:prstGeom prst="rect">
+            <a:avLst/>
+          </a:prstGeom>
+          <a:noFill/>
+          <a:ln w="9525">
+            <a:noFill/>
+            <a:miter lim="800000"/>
+            <a:headEnd/>
+            <a:tailEnd/>
+          </a:ln>
+        </p:spPr>
+      </p:pic>
+    </p:spTree>
+  </p:cSld>
+  <p:clrMapOvr>
+    <a:masterClrMapping/>
+  </p:clrMapOvr>
+  <p:timing>
+    <p:tnLst>
+      <p:par>
+        <p:cTn id="1" dur="indefinite" restart="never" nodeType="tmRoot"/>
+      </p:par>
+    </p:tnLst>
+  </p:timing>
+</p:sld>
+</file>
+
+<file path=ppt/slides/slide21.xml><?xml version="1.0" encoding="utf-8"?>
+<p:sld xmlns:a="http://schemas.openxmlformats.org/drawingml/2006/main" xmlns:r="http://schemas.openxmlformats.org/officeDocument/2006/relationships" xmlns:p="http://schemas.openxmlformats.org/presentationml/2006/main">
+  <p:cSld>
+    <p:spTree>
+      <p:nvGrpSpPr>
+        <p:cNvPr id="1" name=""/>
+        <p:cNvGrpSpPr/>
+        <p:nvPr/>
+      </p:nvGrpSpPr>
+      <p:grpSpPr>
+        <a:xfrm>
+          <a:off x="0" y="0"/>
+          <a:ext cx="0" cy="0"/>
+          <a:chOff x="0" y="0"/>
+          <a:chExt cx="0" cy="0"/>
+        </a:xfrm>
+      </p:grpSpPr>
+      <p:sp>
+        <p:nvSpPr>
+          <p:cNvPr id="2" name="Título 1"/>
+          <p:cNvSpPr>
+            <a:spLocks noGrp="1"/>
+          </p:cNvSpPr>
+          <p:nvPr>
+            <p:ph type="title"/>
+          </p:nvPr>
+        </p:nvSpPr>
+        <p:spPr/>
+        <p:txBody>
+          <a:bodyPr>
+            <a:normAutofit/>
+          </a:bodyPr>
+          <a:lstStyle/>
+          <a:p>
+            <a:r>
+              <a:rPr lang="pt-BR" sz="2500" dirty="0" smtClean="0"/>
+              <a:t>REPOSITÓRIO E CONTROLE DE VERSÃO</a:t>
+            </a:r>
+            <a:endParaRPr lang="pt-BR" sz="2500" dirty="0"/>
+          </a:p>
+        </p:txBody>
+      </p:sp>
+      <p:pic>
+        <p:nvPicPr>
+          <p:cNvPr id="3074" name="Picture 2"/>
+          <p:cNvPicPr>
+            <a:picLocks noGrp="1" noChangeAspect="1" noChangeArrowheads="1"/>
+          </p:cNvPicPr>
+          <p:nvPr>
+            <p:ph idx="1"/>
+          </p:nvPr>
+        </p:nvPicPr>
+        <p:blipFill>
+          <a:blip r:embed="rId2" cstate="print"/>
+          <a:srcRect/>
+          <a:stretch>
+            <a:fillRect/>
+          </a:stretch>
+        </p:blipFill>
+        <p:spPr bwMode="auto">
+          <a:xfrm>
+            <a:off x="1532871" y="2071678"/>
+            <a:ext cx="6110963" cy="4500594"/>
+          </a:xfrm>
+          <a:prstGeom prst="rect">
+            <a:avLst/>
+          </a:prstGeom>
+          <a:noFill/>
+          <a:ln w="9525">
+            <a:noFill/>
+            <a:miter lim="800000"/>
+            <a:headEnd/>
+            <a:tailEnd/>
+          </a:ln>
+        </p:spPr>
+      </p:pic>
+    </p:spTree>
+  </p:cSld>
+  <p:clrMapOvr>
+    <a:masterClrMapping/>
+  </p:clrMapOvr>
+  <p:timing>
+    <p:tnLst>
+      <p:par>
+        <p:cTn id="1" dur="indefinite" restart="never" nodeType="tmRoot"/>
+      </p:par>
+    </p:tnLst>
+  </p:timing>
+</p:sld>
+</file>
+
+<file path=ppt/slides/slide22.xml><?xml version="1.0" encoding="utf-8"?>
+<p:sld xmlns:a="http://schemas.openxmlformats.org/drawingml/2006/main" xmlns:r="http://schemas.openxmlformats.org/officeDocument/2006/relationships" xmlns:p="http://schemas.openxmlformats.org/presentationml/2006/main">
+  <p:cSld>
+    <p:spTree>
+      <p:nvGrpSpPr>
+        <p:cNvPr id="1" name=""/>
+        <p:cNvGrpSpPr/>
+        <p:nvPr/>
+      </p:nvGrpSpPr>
+      <p:grpSpPr>
+        <a:xfrm>
+          <a:off x="0" y="0"/>
+          <a:ext cx="0" cy="0"/>
+          <a:chOff x="0" y="0"/>
+          <a:chExt cx="0" cy="0"/>
+        </a:xfrm>
+      </p:grpSpPr>
+      <p:sp>
+        <p:nvSpPr>
+          <p:cNvPr id="2" name="Título 1"/>
+          <p:cNvSpPr>
+            <a:spLocks noGrp="1"/>
+          </p:cNvSpPr>
+          <p:nvPr>
+            <p:ph type="title"/>
+          </p:nvPr>
+        </p:nvSpPr>
+        <p:spPr/>
+        <p:txBody>
+          <a:bodyPr>
+            <a:normAutofit/>
+          </a:bodyPr>
+          <a:lstStyle/>
+          <a:p>
+            <a:r>
+              <a:rPr lang="pt-BR" sz="2500" dirty="0" smtClean="0"/>
+              <a:t>REPOSITÓRIO E CONTROLE DE VERSÃO</a:t>
+            </a:r>
+            <a:endParaRPr lang="pt-BR" sz="2500" dirty="0"/>
+          </a:p>
+        </p:txBody>
+      </p:sp>
+      <p:pic>
+        <p:nvPicPr>
+          <p:cNvPr id="2051" name="Picture 3"/>
+          <p:cNvPicPr>
+            <a:picLocks noGrp="1" noChangeAspect="1" noChangeArrowheads="1"/>
+          </p:cNvPicPr>
+          <p:nvPr>
+            <p:ph idx="1"/>
+          </p:nvPr>
+        </p:nvPicPr>
+        <p:blipFill>
+          <a:blip r:embed="rId2" cstate="print"/>
+          <a:srcRect/>
+          <a:stretch>
+            <a:fillRect/>
+          </a:stretch>
+        </p:blipFill>
+        <p:spPr bwMode="auto">
+          <a:xfrm>
+            <a:off x="1285852" y="2786058"/>
+            <a:ext cx="6572296" cy="3856918"/>
+          </a:xfrm>
+          <a:prstGeom prst="rect">
+            <a:avLst/>
+          </a:prstGeom>
+          <a:noFill/>
+          <a:ln w="9525">
+            <a:noFill/>
+            <a:miter lim="800000"/>
+            <a:headEnd/>
+            <a:tailEnd/>
+          </a:ln>
+        </p:spPr>
+      </p:pic>
+      <p:pic>
+        <p:nvPicPr>
+          <p:cNvPr id="4099" name="Picture 3"/>
+          <p:cNvPicPr>
+            <a:picLocks noChangeAspect="1" noChangeArrowheads="1"/>
+          </p:cNvPicPr>
+          <p:nvPr/>
+        </p:nvPicPr>
+        <p:blipFill>
+          <a:blip r:embed="rId3" cstate="print"/>
+          <a:srcRect/>
+          <a:stretch>
+            <a:fillRect/>
+          </a:stretch>
+        </p:blipFill>
+        <p:spPr bwMode="auto">
+          <a:xfrm>
+            <a:off x="3000364" y="2030362"/>
+            <a:ext cx="3367095" cy="684258"/>
+          </a:xfrm>
+          <a:prstGeom prst="rect">
+            <a:avLst/>
+          </a:prstGeom>
+          <a:noFill/>
+          <a:ln w="9525">
+            <a:noFill/>
+            <a:miter lim="800000"/>
+            <a:headEnd/>
+            <a:tailEnd/>
+          </a:ln>
+        </p:spPr>
+      </p:pic>
+    </p:spTree>
+  </p:cSld>
+  <p:clrMapOvr>
+    <a:masterClrMapping/>
+  </p:clrMapOvr>
+  <p:timing>
+    <p:tnLst>
+      <p:par>
+        <p:cTn id="1" dur="indefinite" restart="never" nodeType="tmRoot"/>
+      </p:par>
+    </p:tnLst>
+  </p:timing>
+</p:sld>
+</file>
+
+<file path=ppt/slides/slide23.xml><?xml version="1.0" encoding="utf-8"?>
+<p:sld xmlns:a="http://schemas.openxmlformats.org/drawingml/2006/main" xmlns:r="http://schemas.openxmlformats.org/officeDocument/2006/relationships" xmlns:p="http://schemas.openxmlformats.org/presentationml/2006/main">
+  <p:cSld>
+    <p:spTree>
+      <p:nvGrpSpPr>
+        <p:cNvPr id="1" name=""/>
+        <p:cNvGrpSpPr/>
+        <p:nvPr/>
+      </p:nvGrpSpPr>
+      <p:grpSpPr>
+        <a:xfrm>
+          <a:off x="0" y="0"/>
+          <a:ext cx="0" cy="0"/>
+          <a:chOff x="0" y="0"/>
+          <a:chExt cx="0" cy="0"/>
+        </a:xfrm>
+      </p:grpSpPr>
+      <p:sp>
+        <p:nvSpPr>
+          <p:cNvPr id="2" name="Título 1"/>
+          <p:cNvSpPr>
+            <a:spLocks noGrp="1"/>
+          </p:cNvSpPr>
+          <p:nvPr>
+            <p:ph type="title"/>
+          </p:nvPr>
+        </p:nvSpPr>
+        <p:spPr/>
+        <p:txBody>
+          <a:bodyPr>
+            <a:normAutofit/>
+          </a:bodyPr>
+          <a:lstStyle/>
+          <a:p>
+            <a:r>
+              <a:rPr lang="pt-BR" sz="2500" dirty="0" smtClean="0"/>
+              <a:t>DIFICULDADES</a:t>
+            </a:r>
+            <a:endParaRPr lang="pt-BR" sz="2500" dirty="0"/>
+          </a:p>
+        </p:txBody>
+      </p:sp>
+      <p:sp>
+        <p:nvSpPr>
+          <p:cNvPr id="5" name="Espaço Reservado para Conteúdo 4"/>
+          <p:cNvSpPr>
+            <a:spLocks noGrp="1"/>
+          </p:cNvSpPr>
+          <p:nvPr>
+            <p:ph idx="1"/>
+          </p:nvPr>
+        </p:nvSpPr>
+        <p:spPr/>
+        <p:txBody>
+          <a:bodyPr>
+            <a:normAutofit/>
+          </a:bodyPr>
+          <a:lstStyle/>
+          <a:p>
+            <a:r>
+              <a:rPr lang="pt-BR" sz="1800" dirty="0" smtClean="0"/>
+              <a:t>Compra de componentes.</a:t>
+            </a:r>
+          </a:p>
+          <a:p>
+            <a:r>
+              <a:rPr lang="pt-BR" sz="1800" dirty="0" smtClean="0"/>
+              <a:t>Soldagem do acelerômetro.</a:t>
+            </a:r>
+          </a:p>
+          <a:p>
+            <a:r>
+              <a:rPr lang="pt-BR" sz="1800" dirty="0" smtClean="0"/>
+              <a:t>Reuso da biblioteca RF da Texas Instruments.</a:t>
+            </a:r>
+          </a:p>
+          <a:p>
+            <a:r>
+              <a:rPr lang="pt-BR" sz="1800" dirty="0" smtClean="0"/>
+              <a:t>Desenvolver um código onde funcionam simultaneamente o RF e o acelerômetro.</a:t>
+            </a:r>
+          </a:p>
+          <a:p>
+            <a:r>
+              <a:rPr lang="pt-BR" sz="1800" dirty="0" smtClean="0"/>
+              <a:t>Falhas </a:t>
+            </a:r>
+            <a:r>
+              <a:rPr lang="pt-BR" sz="1800" dirty="0" smtClean="0"/>
+              <a:t>nas pilhas do kit de desenvolvimento eZ430-RF2500.</a:t>
+            </a:r>
+          </a:p>
+          <a:p>
+            <a:r>
+              <a:rPr lang="pt-BR" sz="1800" dirty="0" smtClean="0"/>
+              <a:t>A documentação do acelerômetro demonstrou uma leitura difícil e com poucas explicações em algumas seções.</a:t>
+            </a:r>
+          </a:p>
+          <a:p>
+            <a:r>
+              <a:rPr lang="pt-BR" sz="1800" dirty="0" smtClean="0"/>
+              <a:t>A documentação do MSP430 não tem informações suficientes sobre o funcionamento da interface SPI a 3 fios.</a:t>
+            </a:r>
+          </a:p>
+          <a:p>
+            <a:r>
+              <a:rPr lang="pt-BR" sz="1800" dirty="0" smtClean="0"/>
+              <a:t>A documentação do acelerômetro contém um algoritmo de leitura/escrita que mostrou não ser adequado para funcionar no modo SPI a 3 fios.</a:t>
+            </a:r>
+            <a:endParaRPr lang="pt-BR" sz="1800" dirty="0"/>
+          </a:p>
+        </p:txBody>
+      </p:sp>
+    </p:spTree>
+  </p:cSld>
+  <p:clrMapOvr>
+    <a:masterClrMapping/>
+  </p:clrMapOvr>
+  <p:timing>
+    <p:tnLst>
+      <p:par>
+        <p:cTn id="1" dur="indefinite" restart="never" nodeType="tmRoot"/>
+      </p:par>
+    </p:tnLst>
+  </p:timing>
+</p:sld>
+</file>
+
+<file path=ppt/slides/slide24.xml><?xml version="1.0" encoding="utf-8"?>
+<p:sld xmlns:a="http://schemas.openxmlformats.org/drawingml/2006/main" xmlns:r="http://schemas.openxmlformats.org/officeDocument/2006/relationships" xmlns:p="http://schemas.openxmlformats.org/presentationml/2006/main">
+  <p:cSld>
+    <p:spTree>
+      <p:nvGrpSpPr>
+        <p:cNvPr id="1" name=""/>
+        <p:cNvGrpSpPr/>
+        <p:nvPr/>
+      </p:nvGrpSpPr>
+      <p:grpSpPr>
+        <a:xfrm>
+          <a:off x="0" y="0"/>
+          <a:ext cx="0" cy="0"/>
+          <a:chOff x="0" y="0"/>
+          <a:chExt cx="0" cy="0"/>
+        </a:xfrm>
+      </p:grpSpPr>
+      <p:sp>
+        <p:nvSpPr>
+          <p:cNvPr id="2" name="Título 1"/>
+          <p:cNvSpPr>
+            <a:spLocks noGrp="1"/>
+          </p:cNvSpPr>
+          <p:nvPr>
+            <p:ph type="title"/>
+          </p:nvPr>
+        </p:nvSpPr>
+        <p:spPr/>
+        <p:txBody>
+          <a:bodyPr>
+            <a:normAutofit/>
+          </a:bodyPr>
+          <a:lstStyle/>
+          <a:p>
+            <a:r>
+              <a:rPr lang="en-US" sz="2500" dirty="0" smtClean="0"/>
+              <a:t>REFERÊNCIAS BIBLIOGRÁFICAS</a:t>
+            </a:r>
+            <a:endParaRPr lang="pt-BR" sz="2500" dirty="0"/>
+          </a:p>
+        </p:txBody>
+      </p:sp>
+      <p:sp>
+        <p:nvSpPr>
+          <p:cNvPr id="5" name="Espaço Reservado para Conteúdo 4"/>
+          <p:cNvSpPr>
+            <a:spLocks noGrp="1"/>
+          </p:cNvSpPr>
+          <p:nvPr>
+            <p:ph idx="1"/>
+          </p:nvPr>
+        </p:nvSpPr>
+        <p:spPr/>
+        <p:txBody>
+          <a:bodyPr>
+            <a:noAutofit/>
+          </a:bodyPr>
+          <a:lstStyle/>
+          <a:p>
+            <a:r>
+              <a:rPr lang="pt-BR" sz="1800" i="1" dirty="0" smtClean="0"/>
+              <a:t>MSP430 </a:t>
+            </a:r>
+            <a:r>
+              <a:rPr lang="pt-BR" sz="1800" i="1" dirty="0" err="1" smtClean="0"/>
+              <a:t>Microcontroller</a:t>
+            </a:r>
+            <a:r>
+              <a:rPr lang="pt-BR" sz="1800" i="1" dirty="0" smtClean="0"/>
+              <a:t> </a:t>
+            </a:r>
+            <a:r>
+              <a:rPr lang="pt-BR" sz="1800" i="1" dirty="0" err="1" smtClean="0"/>
+              <a:t>Basics</a:t>
+            </a:r>
+            <a:r>
+              <a:rPr lang="pt-BR" sz="1800" dirty="0" smtClean="0"/>
+              <a:t>, John </a:t>
+            </a:r>
+            <a:r>
+              <a:rPr lang="pt-BR" sz="1800" dirty="0" err="1" smtClean="0"/>
+              <a:t>Davies</a:t>
+            </a:r>
+            <a:r>
+              <a:rPr lang="pt-BR" sz="1800" dirty="0" smtClean="0"/>
+              <a:t>, 2008</a:t>
+            </a:r>
+          </a:p>
+          <a:p>
+            <a:r>
+              <a:rPr lang="pt-BR" sz="1800" i="1" dirty="0" smtClean="0"/>
+              <a:t>MMA7455L Datasheet</a:t>
+            </a:r>
+            <a:r>
+              <a:rPr lang="pt-BR" sz="1800" dirty="0" smtClean="0"/>
+              <a:t>, Freescale </a:t>
+            </a:r>
+            <a:r>
+              <a:rPr lang="pt-BR" sz="1800" dirty="0" err="1" smtClean="0"/>
+              <a:t>Semiconductor</a:t>
+            </a:r>
+            <a:r>
+              <a:rPr lang="pt-BR" sz="1800" dirty="0" smtClean="0"/>
+              <a:t>, 2009</a:t>
+            </a:r>
+          </a:p>
+          <a:p>
+            <a:r>
+              <a:rPr lang="pt-BR" sz="1800" i="1" dirty="0" err="1" smtClean="0"/>
+              <a:t>The</a:t>
+            </a:r>
+            <a:r>
+              <a:rPr lang="pt-BR" sz="1800" i="1" dirty="0" smtClean="0"/>
+              <a:t> MMA745xL Digital </a:t>
+            </a:r>
+            <a:r>
+              <a:rPr lang="pt-BR" sz="1800" i="1" dirty="0" err="1" smtClean="0"/>
+              <a:t>Accelerometer</a:t>
+            </a:r>
+            <a:r>
+              <a:rPr lang="pt-BR" sz="1800" i="1" dirty="0" smtClean="0"/>
+              <a:t> (AN3468)</a:t>
+            </a:r>
+            <a:r>
+              <a:rPr lang="pt-BR" sz="1800" dirty="0" smtClean="0"/>
+              <a:t>, Freescale </a:t>
+            </a:r>
+            <a:r>
+              <a:rPr lang="pt-BR" sz="1800" dirty="0" err="1" smtClean="0"/>
+              <a:t>Semiconductor</a:t>
+            </a:r>
+            <a:r>
+              <a:rPr lang="pt-BR" sz="1800" dirty="0" smtClean="0"/>
+              <a:t>, 2009</a:t>
+            </a:r>
+          </a:p>
+          <a:p>
+            <a:r>
+              <a:rPr lang="en-US" sz="1800" i="1" dirty="0" smtClean="0"/>
+              <a:t>CC2500 Datasheet</a:t>
+            </a:r>
+            <a:r>
+              <a:rPr lang="en-US" sz="1800" dirty="0" smtClean="0"/>
+              <a:t>, </a:t>
+            </a:r>
+            <a:r>
+              <a:rPr lang="en-US" sz="1800" dirty="0" err="1" smtClean="0"/>
+              <a:t>Chipcon</a:t>
+            </a:r>
+            <a:r>
+              <a:rPr lang="en-US" sz="1800" dirty="0" smtClean="0"/>
+              <a:t>, 2006</a:t>
+            </a:r>
+          </a:p>
+          <a:p>
+            <a:r>
+              <a:rPr lang="pt-BR" sz="1800" i="1" dirty="0" smtClean="0"/>
+              <a:t>eZ430-RF2500 </a:t>
+            </a:r>
+            <a:r>
+              <a:rPr lang="pt-BR" sz="1800" i="1" dirty="0" err="1" smtClean="0"/>
+              <a:t>Development</a:t>
+            </a:r>
+            <a:r>
+              <a:rPr lang="pt-BR" sz="1800" i="1" dirty="0" smtClean="0"/>
+              <a:t> </a:t>
+            </a:r>
+            <a:r>
+              <a:rPr lang="pt-BR" sz="1800" i="1" dirty="0" err="1" smtClean="0"/>
+              <a:t>Tool</a:t>
+            </a:r>
+            <a:r>
+              <a:rPr lang="pt-BR" sz="1800" i="1" dirty="0" smtClean="0"/>
+              <a:t> – </a:t>
+            </a:r>
+            <a:r>
+              <a:rPr lang="pt-BR" sz="1800" i="1" dirty="0" err="1" smtClean="0"/>
+              <a:t>User’s</a:t>
+            </a:r>
+            <a:r>
+              <a:rPr lang="pt-BR" sz="1800" i="1" dirty="0" smtClean="0"/>
+              <a:t> </a:t>
+            </a:r>
+            <a:r>
+              <a:rPr lang="pt-BR" sz="1800" i="1" dirty="0" err="1" smtClean="0"/>
+              <a:t>Guide</a:t>
+            </a:r>
+            <a:r>
+              <a:rPr lang="pt-BR" sz="1800" dirty="0" smtClean="0"/>
+              <a:t>, Texas Instruments, 2009</a:t>
+            </a:r>
+          </a:p>
+          <a:p>
+            <a:r>
+              <a:rPr lang="pt-BR" sz="1800" i="1" dirty="0" smtClean="0"/>
+              <a:t>MSP430x2xx </a:t>
+            </a:r>
+            <a:r>
+              <a:rPr lang="pt-BR" sz="1800" i="1" dirty="0" err="1" smtClean="0"/>
+              <a:t>Family</a:t>
+            </a:r>
+            <a:r>
+              <a:rPr lang="pt-BR" sz="1800" i="1" dirty="0" smtClean="0"/>
+              <a:t> – </a:t>
+            </a:r>
+            <a:r>
+              <a:rPr lang="pt-BR" sz="1800" i="1" dirty="0" err="1" smtClean="0"/>
+              <a:t>User's</a:t>
+            </a:r>
+            <a:r>
+              <a:rPr lang="pt-BR" sz="1800" i="1" dirty="0" smtClean="0"/>
+              <a:t> </a:t>
+            </a:r>
+            <a:r>
+              <a:rPr lang="pt-BR" sz="1800" i="1" dirty="0" err="1" smtClean="0"/>
+              <a:t>Guide</a:t>
+            </a:r>
+            <a:r>
+              <a:rPr lang="pt-BR" sz="1800" dirty="0" smtClean="0"/>
+              <a:t>, Texas Instruments, </a:t>
+            </a:r>
+            <a:r>
+              <a:rPr lang="pt-BR" sz="1800" dirty="0" smtClean="0"/>
+              <a:t>2009</a:t>
+            </a:r>
+          </a:p>
+          <a:p>
+            <a:r>
+              <a:rPr lang="pt-BR" sz="1800" i="1" dirty="0" smtClean="0"/>
+              <a:t>MSP430 Interface to CC1100/2500 Code </a:t>
+            </a:r>
+            <a:r>
+              <a:rPr lang="pt-BR" sz="1800" i="1" dirty="0" err="1" smtClean="0"/>
+              <a:t>Library</a:t>
+            </a:r>
+            <a:r>
+              <a:rPr lang="pt-BR" sz="1800" i="1" dirty="0" smtClean="0"/>
+              <a:t> (SLAA325A)</a:t>
+            </a:r>
+            <a:r>
+              <a:rPr lang="pt-BR" sz="1800" dirty="0" smtClean="0"/>
+              <a:t>, Texas Instruments, 2010</a:t>
+            </a:r>
+            <a:endParaRPr lang="pt-BR" sz="1800" dirty="0" smtClean="0"/>
           </a:p>
         </p:txBody>
       </p:sp>
@@ -6024,10 +6593,24 @@
           <a:prstGeom prst="rect">
             <a:avLst/>
           </a:prstGeom>
-          <a:ln>
+          <a:ln w="9525">
+            <a:prstDash val="sysDot"/>
             <a:headEnd/>
             <a:tailEnd/>
           </a:ln>
+          <a:effectLst>
+            <a:glow rad="228600">
+              <a:schemeClr val="accent6">
+                <a:satMod val="175000"/>
+                <a:alpha val="40000"/>
+              </a:schemeClr>
+            </a:glow>
+            <a:outerShdw blurRad="51500" dist="25400" dir="5400000" rotWithShape="0">
+              <a:srgbClr val="000000">
+                <a:alpha val="40000"/>
+              </a:srgbClr>
+            </a:outerShdw>
+          </a:effectLst>
         </p:spPr>
         <p:style>
           <a:lnRef idx="1">
@@ -6067,10 +6650,17 @@
           <a:prstGeom prst="rect">
             <a:avLst/>
           </a:prstGeom>
-          <a:ln>
+          <a:ln w="6350">
             <a:headEnd/>
             <a:tailEnd/>
           </a:ln>
+          <a:effectLst>
+            <a:outerShdw blurRad="51500" dist="25400" dir="5400000" rotWithShape="0">
+              <a:srgbClr val="000000">
+                <a:alpha val="40000"/>
+              </a:srgbClr>
+            </a:outerShdw>
+          </a:effectLst>
         </p:spPr>
         <p:style>
           <a:lnRef idx="1">
@@ -6101,6 +6691,7 @@
           <a:prstGeom prst="rect">
             <a:avLst/>
           </a:prstGeom>
+          <a:ln w="3175"/>
         </p:spPr>
         <p:style>
           <a:lnRef idx="1">
@@ -6148,6 +6739,9 @@
           <a:prstGeom prst="rect">
             <a:avLst/>
           </a:prstGeom>
+          <a:ln w="3175">
+            <a:prstDash val="solid"/>
+          </a:ln>
         </p:spPr>
         <p:style>
           <a:lnRef idx="1">
@@ -6232,11 +6826,7 @@
           <a:p>
             <a:r>
               <a:rPr lang="pt-BR" sz="2500" dirty="0" smtClean="0"/>
-              <a:t>FIRMWARE - </a:t>
-            </a:r>
-            <a:r>
-              <a:rPr lang="pt-BR" sz="2500" dirty="0" smtClean="0"/>
-              <a:t>TRANSMISSOR</a:t>
+              <a:t>ACELERÔMETRO (FREESCALE)</a:t>
             </a:r>
             <a:endParaRPr lang="pt-BR" sz="2500" dirty="0"/>
           </a:p>
@@ -6244,7 +6834,7 @@
       </p:sp>
       <p:pic>
         <p:nvPicPr>
-          <p:cNvPr id="1027" name="Picture 3"/>
+          <p:cNvPr id="1026" name="Picture 2"/>
           <p:cNvPicPr>
             <a:picLocks noChangeAspect="1" noChangeArrowheads="1"/>
           </p:cNvPicPr>
@@ -6259,8 +6849,8 @@
         </p:blipFill>
         <p:spPr bwMode="auto">
           <a:xfrm>
-            <a:off x="1428728" y="2143116"/>
-            <a:ext cx="6362700" cy="4371975"/>
+            <a:off x="979345" y="2110966"/>
+            <a:ext cx="2949713" cy="4389868"/>
           </a:xfrm>
           <a:prstGeom prst="rect">
             <a:avLst/>
@@ -6274,6 +6864,114 @@
           </a:ln>
         </p:spPr>
       </p:pic>
+      <p:sp>
+        <p:nvSpPr>
+          <p:cNvPr id="5" name="Espaço Reservado para Conteúdo 5"/>
+          <p:cNvSpPr>
+            <a:spLocks noGrp="1"/>
+          </p:cNvSpPr>
+          <p:nvPr>
+            <p:ph idx="1"/>
+          </p:nvPr>
+        </p:nvSpPr>
+        <p:spPr>
+          <a:xfrm>
+            <a:off x="4243414" y="2249424"/>
+            <a:ext cx="4614866" cy="4325112"/>
+          </a:xfrm>
+        </p:spPr>
+        <p:txBody>
+          <a:bodyPr>
+            <a:normAutofit/>
+          </a:bodyPr>
+          <a:lstStyle/>
+          <a:p>
+            <a:r>
+              <a:rPr lang="pt-BR" sz="1600" dirty="0" smtClean="0"/>
+              <a:t>Saída digital (I2C ou SPI)</a:t>
+            </a:r>
+          </a:p>
+          <a:p>
+            <a:r>
+              <a:rPr lang="pt-BR" sz="1600" dirty="0" smtClean="0"/>
+              <a:t>Baixa tensão de operação (2,4V – 3,6V)</a:t>
+            </a:r>
+          </a:p>
+          <a:p>
+            <a:r>
+              <a:rPr lang="pt-BR" sz="1600" dirty="0" smtClean="0"/>
+              <a:t>Modos de funcionamento:</a:t>
+            </a:r>
+          </a:p>
+          <a:p>
+            <a:pPr lvl="1"/>
+            <a:r>
+              <a:rPr lang="pt-BR" sz="1400" dirty="0" smtClean="0"/>
+              <a:t>Detecção de nível</a:t>
+            </a:r>
+          </a:p>
+          <a:p>
+            <a:pPr lvl="1"/>
+            <a:r>
+              <a:rPr lang="pt-BR" sz="1400" dirty="0" smtClean="0"/>
+              <a:t>Detecção de pulso</a:t>
+            </a:r>
+          </a:p>
+          <a:p>
+            <a:pPr lvl="1"/>
+            <a:r>
+              <a:rPr lang="pt-BR" sz="1400" dirty="0" smtClean="0"/>
+              <a:t>Medição contínua</a:t>
+            </a:r>
+          </a:p>
+          <a:p>
+            <a:r>
+              <a:rPr lang="pt-BR" sz="1600" dirty="0" smtClean="0"/>
+              <a:t>Sensibilidade:</a:t>
+            </a:r>
+          </a:p>
+          <a:p>
+            <a:pPr lvl="1"/>
+            <a:r>
+              <a:rPr lang="pt-BR" sz="1400" dirty="0" smtClean="0"/>
+              <a:t>2g – 64 LSB/g</a:t>
+            </a:r>
+          </a:p>
+          <a:p>
+            <a:pPr lvl="1"/>
+            <a:r>
+              <a:rPr lang="pt-BR" sz="1400" dirty="0" smtClean="0"/>
+              <a:t>4g – 32 LSB/g</a:t>
+            </a:r>
+          </a:p>
+          <a:p>
+            <a:pPr lvl="1"/>
+            <a:r>
+              <a:rPr lang="pt-BR" sz="1400" dirty="0" smtClean="0"/>
+              <a:t>8g – 16 LSB/g</a:t>
+            </a:r>
+          </a:p>
+          <a:p>
+            <a:r>
+              <a:rPr lang="pt-BR" sz="1600" dirty="0" smtClean="0"/>
+              <a:t>Encapsulamento LGA-14 robusto suporta impactos de até 5000g</a:t>
+            </a:r>
+          </a:p>
+          <a:p>
+            <a:r>
+              <a:rPr lang="pt-BR" sz="1600" dirty="0" smtClean="0"/>
+              <a:t>31 registradores</a:t>
+            </a:r>
+            <a:endParaRPr lang="pt-BR" sz="1600" dirty="0" smtClean="0"/>
+          </a:p>
+          <a:p>
+            <a:pPr>
+              <a:buNone/>
+            </a:pPr>
+            <a:endParaRPr lang="pt-BR" sz="2200" dirty="0" smtClean="0"/>
+          </a:p>
+        </p:txBody>
+      </p:sp>
     </p:spTree>
   </p:cSld>
   <p:clrMapOvr>
@@ -6325,11 +7023,7 @@
           <a:p>
             <a:r>
               <a:rPr lang="pt-BR" sz="2500" dirty="0" smtClean="0"/>
-              <a:t>FIRMWARE - </a:t>
-            </a:r>
-            <a:r>
-              <a:rPr lang="pt-BR" sz="2500" dirty="0" smtClean="0"/>
-              <a:t>TRANSMISSOR</a:t>
+              <a:t>ACELERÔMETRO (FREESCALE)</a:t>
             </a:r>
             <a:endParaRPr lang="pt-BR" sz="2500" dirty="0"/>
           </a:p>
@@ -6337,7 +7031,7 @@
       </p:sp>
       <p:pic>
         <p:nvPicPr>
-          <p:cNvPr id="1026" name="Picture 2"/>
+          <p:cNvPr id="2051" name="Picture 3"/>
           <p:cNvPicPr>
             <a:picLocks noChangeAspect="1" noChangeArrowheads="1"/>
           </p:cNvPicPr>
@@ -6352,8 +7046,172 @@
         </p:blipFill>
         <p:spPr bwMode="auto">
           <a:xfrm>
-            <a:off x="39724" y="2428868"/>
-            <a:ext cx="9072594" cy="3673518"/>
+            <a:off x="768350" y="3261042"/>
+            <a:ext cx="5838838" cy="3073073"/>
+          </a:xfrm>
+          <a:prstGeom prst="rect">
+            <a:avLst/>
+          </a:prstGeom>
+          <a:noFill/>
+          <a:ln w="9525">
+            <a:noFill/>
+            <a:miter lim="800000"/>
+            <a:headEnd/>
+            <a:tailEnd/>
+          </a:ln>
+          <a:effectLst>
+            <a:glow rad="139700">
+              <a:schemeClr val="accent2">
+                <a:satMod val="175000"/>
+                <a:alpha val="40000"/>
+              </a:schemeClr>
+            </a:glow>
+          </a:effectLst>
+        </p:spPr>
+      </p:pic>
+      <p:pic>
+        <p:nvPicPr>
+          <p:cNvPr id="2052" name="Picture 4"/>
+          <p:cNvPicPr>
+            <a:picLocks noChangeAspect="1" noChangeArrowheads="1"/>
+          </p:cNvPicPr>
+          <p:nvPr/>
+        </p:nvPicPr>
+        <p:blipFill>
+          <a:blip r:embed="rId3" cstate="print"/>
+          <a:srcRect/>
+          <a:stretch>
+            <a:fillRect/>
+          </a:stretch>
+        </p:blipFill>
+        <p:spPr bwMode="auto">
+          <a:xfrm>
+            <a:off x="5178428" y="2285992"/>
+            <a:ext cx="3236814" cy="1714512"/>
+          </a:xfrm>
+          <a:prstGeom prst="rect">
+            <a:avLst/>
+          </a:prstGeom>
+          <a:noFill/>
+          <a:ln w="9525">
+            <a:solidFill>
+              <a:schemeClr val="accent4"/>
+            </a:solidFill>
+            <a:miter lim="800000"/>
+            <a:headEnd/>
+            <a:tailEnd/>
+          </a:ln>
+          <a:effectLst>
+            <a:glow rad="139700">
+              <a:schemeClr val="accent5">
+                <a:satMod val="175000"/>
+                <a:alpha val="40000"/>
+              </a:schemeClr>
+            </a:glow>
+          </a:effectLst>
+        </p:spPr>
+      </p:pic>
+      <p:sp>
+        <p:nvSpPr>
+          <p:cNvPr id="12" name="Retângulo 11"/>
+          <p:cNvSpPr/>
+          <p:nvPr/>
+        </p:nvSpPr>
+        <p:spPr>
+          <a:xfrm>
+            <a:off x="1665266" y="4046542"/>
+            <a:ext cx="642942" cy="1500198"/>
+          </a:xfrm>
+          <a:prstGeom prst="rect">
+            <a:avLst/>
+          </a:prstGeom>
+          <a:noFill/>
+          <a:effectLst>
+            <a:glow rad="63500">
+              <a:schemeClr val="accent5">
+                <a:satMod val="175000"/>
+                <a:alpha val="40000"/>
+              </a:schemeClr>
+            </a:glow>
+          </a:effectLst>
+        </p:spPr>
+        <p:style>
+          <a:lnRef idx="2">
+            <a:schemeClr val="accent4"/>
+          </a:lnRef>
+          <a:fillRef idx="1">
+            <a:schemeClr val="lt1"/>
+          </a:fillRef>
+          <a:effectRef idx="0">
+            <a:schemeClr val="accent4"/>
+          </a:effectRef>
+          <a:fontRef idx="minor">
+            <a:schemeClr val="dk1"/>
+          </a:fontRef>
+        </p:style>
+        <p:txBody>
+          <a:bodyPr rtlCol="0" anchor="ctr"/>
+          <a:lstStyle/>
+          <a:p>
+            <a:pPr algn="ctr"/>
+            <a:endParaRPr lang="pt-BR"/>
+          </a:p>
+        </p:txBody>
+      </p:sp>
+      <p:cxnSp>
+        <p:nvCxnSpPr>
+          <p:cNvPr id="14" name="Conector angulado 13"/>
+          <p:cNvCxnSpPr/>
+          <p:nvPr/>
+        </p:nvCxnSpPr>
+        <p:spPr>
+          <a:xfrm flipV="1">
+            <a:off x="2320908" y="2786058"/>
+            <a:ext cx="2857520" cy="1357322"/>
+          </a:xfrm>
+          <a:prstGeom prst="bentConnector3">
+            <a:avLst>
+              <a:gd name="adj1" fmla="val 21556"/>
+            </a:avLst>
+          </a:prstGeom>
+          <a:ln>
+            <a:tailEnd type="arrow"/>
+          </a:ln>
+        </p:spPr>
+        <p:style>
+          <a:lnRef idx="2">
+            <a:schemeClr val="accent4"/>
+          </a:lnRef>
+          <a:fillRef idx="0">
+            <a:schemeClr val="accent4"/>
+          </a:fillRef>
+          <a:effectRef idx="1">
+            <a:schemeClr val="accent4"/>
+          </a:effectRef>
+          <a:fontRef idx="minor">
+            <a:schemeClr val="tx1"/>
+          </a:fontRef>
+        </p:style>
+      </p:cxnSp>
+      <p:pic>
+        <p:nvPicPr>
+          <p:cNvPr id="2053" name="Picture 5"/>
+          <p:cNvPicPr>
+            <a:picLocks noChangeAspect="1" noChangeArrowheads="1"/>
+          </p:cNvPicPr>
+          <p:nvPr/>
+        </p:nvPicPr>
+        <p:blipFill>
+          <a:blip r:embed="rId4" cstate="print"/>
+          <a:srcRect/>
+          <a:stretch>
+            <a:fillRect/>
+          </a:stretch>
+        </p:blipFill>
+        <p:spPr bwMode="auto">
+          <a:xfrm>
+            <a:off x="7143768" y="5000636"/>
+            <a:ext cx="1085509" cy="500066"/>
           </a:xfrm>
           <a:prstGeom prst="rect">
             <a:avLst/>
@@ -6418,11 +7276,7 @@
           <a:p>
             <a:r>
               <a:rPr lang="pt-BR" sz="2500" dirty="0" smtClean="0"/>
-              <a:t>FIRMWARE - </a:t>
-            </a:r>
-            <a:r>
-              <a:rPr lang="pt-BR" sz="2500" dirty="0" smtClean="0"/>
-              <a:t>TRANSMISSOR</a:t>
+              <a:t>ACELERÔMETRO (FREESCALE)</a:t>
             </a:r>
             <a:endParaRPr lang="pt-BR" sz="2500" dirty="0"/>
           </a:p>
@@ -6430,7 +7284,7 @@
       </p:sp>
       <p:pic>
         <p:nvPicPr>
-          <p:cNvPr id="10242" name="Picture 2"/>
+          <p:cNvPr id="3074" name="Picture 2"/>
           <p:cNvPicPr>
             <a:picLocks noChangeAspect="1" noChangeArrowheads="1"/>
           </p:cNvPicPr>
@@ -6445,40 +7299,8 @@
         </p:blipFill>
         <p:spPr bwMode="auto">
           <a:xfrm>
-            <a:off x="628641" y="2857496"/>
-            <a:ext cx="4327186" cy="2990849"/>
-          </a:xfrm>
-          <a:prstGeom prst="rect">
-            <a:avLst/>
-          </a:prstGeom>
-          <a:noFill/>
-          <a:ln w="9525">
-            <a:noFill/>
-            <a:miter lim="800000"/>
-            <a:headEnd/>
-            <a:tailEnd/>
-          </a:ln>
-        </p:spPr>
-      </p:pic>
-      <p:pic>
-        <p:nvPicPr>
-          <p:cNvPr id="10243" name="Picture 3"/>
-          <p:cNvPicPr>
-            <a:picLocks noChangeAspect="1" noChangeArrowheads="1"/>
-          </p:cNvPicPr>
-          <p:nvPr/>
-        </p:nvPicPr>
-        <p:blipFill>
-          <a:blip r:embed="rId3" cstate="print"/>
-          <a:srcRect/>
-          <a:stretch>
-            <a:fillRect/>
-          </a:stretch>
-        </p:blipFill>
-        <p:spPr bwMode="auto">
-          <a:xfrm>
-            <a:off x="5557863" y="2857496"/>
-            <a:ext cx="2657475" cy="2952750"/>
+            <a:off x="1200150" y="1928802"/>
+            <a:ext cx="6743700" cy="4733925"/>
           </a:xfrm>
           <a:prstGeom prst="rect">
             <a:avLst/>

</xml_diff>